<commit_message>
Add Class 3 Scripts
</commit_message>
<xml_diff>
--- a/g1/Class 3/Presentation/Database Development and Design - Session 3.pptx
+++ b/g1/Class 3/Presentation/Database Development and Design - Session 3.pptx
@@ -5,7 +5,7 @@
     <p:sldMasterId id="2147483648" r:id="rId1"/>
   </p:sldMasterIdLst>
   <p:notesMasterIdLst>
-    <p:notesMasterId r:id="rId30"/>
+    <p:notesMasterId r:id="rId23"/>
   </p:notesMasterIdLst>
   <p:sldIdLst>
     <p:sldId id="297" r:id="rId2"/>
@@ -24,18 +24,11 @@
     <p:sldId id="393" r:id="rId15"/>
     <p:sldId id="395" r:id="rId16"/>
     <p:sldId id="396" r:id="rId17"/>
-    <p:sldId id="397" r:id="rId18"/>
-    <p:sldId id="398" r:id="rId19"/>
-    <p:sldId id="399" r:id="rId20"/>
-    <p:sldId id="345" r:id="rId21"/>
-    <p:sldId id="281" r:id="rId22"/>
-    <p:sldId id="282" r:id="rId23"/>
-    <p:sldId id="283" r:id="rId24"/>
-    <p:sldId id="400" r:id="rId25"/>
-    <p:sldId id="401" r:id="rId26"/>
-    <p:sldId id="402" r:id="rId27"/>
-    <p:sldId id="403" r:id="rId28"/>
-    <p:sldId id="404" r:id="rId29"/>
+    <p:sldId id="399" r:id="rId18"/>
+    <p:sldId id="345" r:id="rId19"/>
+    <p:sldId id="281" r:id="rId20"/>
+    <p:sldId id="282" r:id="rId21"/>
+    <p:sldId id="283" r:id="rId22"/>
   </p:sldIdLst>
   <p:sldSz cx="12192000" cy="6858000"/>
   <p:notesSz cx="6858000" cy="9144000"/>
@@ -175,8 +168,6 @@
           <p14:sldIdLst>
             <p14:sldId id="395"/>
             <p14:sldId id="396"/>
-            <p14:sldId id="397"/>
-            <p14:sldId id="398"/>
             <p14:sldId id="399"/>
           </p14:sldIdLst>
         </p14:section>
@@ -186,15 +177,6 @@
             <p14:sldId id="281"/>
             <p14:sldId id="282"/>
             <p14:sldId id="283"/>
-          </p14:sldIdLst>
-        </p14:section>
-        <p14:section name="Homework" id="{3638468B-2668-4040-841F-6E04CB1EAC2F}">
-          <p14:sldIdLst>
-            <p14:sldId id="400"/>
-            <p14:sldId id="401"/>
-            <p14:sldId id="402"/>
-            <p14:sldId id="403"/>
-            <p14:sldId id="404"/>
           </p14:sldIdLst>
         </p14:section>
       </p14:sectionLst>
@@ -291,7 +273,7 @@
           <a:p>
             <a:fld id="{080C2AC4-95A3-4C7D-BB88-DA8C525E531F}" type="datetimeFigureOut">
               <a:rPr lang="en-US" smtClean="0"/>
-              <a:t>5/16/2019</a:t>
+              <a:t>18-May-19</a:t>
             </a:fld>
             <a:endParaRPr lang="en-US"/>
           </a:p>
@@ -1450,7 +1432,7 @@
             <a:fld id="{B61BEF0D-F0BB-DE4B-95CE-6DB70DBA9567}" type="datetimeFigureOut">
               <a:rPr lang="en-US" dirty="0"/>
               <a:pPr/>
-              <a:t>5/16/2019</a:t>
+              <a:t>18-May-19</a:t>
             </a:fld>
             <a:endParaRPr lang="en-US" dirty="0"/>
           </a:p>
@@ -1698,7 +1680,7 @@
             <a:fld id="{B61BEF0D-F0BB-DE4B-95CE-6DB70DBA9567}" type="datetimeFigureOut">
               <a:rPr lang="en-US" dirty="0"/>
               <a:pPr/>
-              <a:t>5/16/2019</a:t>
+              <a:t>18-May-19</a:t>
             </a:fld>
             <a:endParaRPr lang="en-US" dirty="0"/>
           </a:p>
@@ -2009,7 +1991,7 @@
             <a:fld id="{B61BEF0D-F0BB-DE4B-95CE-6DB70DBA9567}" type="datetimeFigureOut">
               <a:rPr lang="en-US" dirty="0"/>
               <a:pPr/>
-              <a:t>5/16/2019</a:t>
+              <a:t>18-May-19</a:t>
             </a:fld>
             <a:endParaRPr lang="en-US" dirty="0"/>
           </a:p>
@@ -2347,7 +2329,7 @@
             <a:fld id="{B61BEF0D-F0BB-DE4B-95CE-6DB70DBA9567}" type="datetimeFigureOut">
               <a:rPr lang="en-US" dirty="0"/>
               <a:pPr/>
-              <a:t>5/16/2019</a:t>
+              <a:t>18-May-19</a:t>
             </a:fld>
             <a:endParaRPr lang="en-US" dirty="0"/>
           </a:p>
@@ -2658,7 +2640,7 @@
             <a:fld id="{B61BEF0D-F0BB-DE4B-95CE-6DB70DBA9567}" type="datetimeFigureOut">
               <a:rPr lang="en-US" dirty="0"/>
               <a:pPr/>
-              <a:t>5/16/2019</a:t>
+              <a:t>18-May-19</a:t>
             </a:fld>
             <a:endParaRPr lang="en-US" dirty="0"/>
           </a:p>
@@ -3048,7 +3030,7 @@
             <a:fld id="{B61BEF0D-F0BB-DE4B-95CE-6DB70DBA9567}" type="datetimeFigureOut">
               <a:rPr lang="en-US" dirty="0"/>
               <a:pPr/>
-              <a:t>5/16/2019</a:t>
+              <a:t>18-May-19</a:t>
             </a:fld>
             <a:endParaRPr lang="en-US" dirty="0"/>
           </a:p>
@@ -3214,7 +3196,7 @@
           <a:p>
             <a:fld id="{55C6B4A9-1611-4792-9094-5F34BCA07E0B}" type="datetimeFigureOut">
               <a:rPr lang="en-US" dirty="0"/>
-              <a:t>5/16/2019</a:t>
+              <a:t>18-May-19</a:t>
             </a:fld>
             <a:endParaRPr lang="en-US" dirty="0"/>
           </a:p>
@@ -3390,7 +3372,7 @@
             <a:fld id="{B61BEF0D-F0BB-DE4B-95CE-6DB70DBA9567}" type="datetimeFigureOut">
               <a:rPr lang="en-US" dirty="0"/>
               <a:pPr/>
-              <a:t>5/16/2019</a:t>
+              <a:t>18-May-19</a:t>
             </a:fld>
             <a:endParaRPr lang="en-US" dirty="0"/>
           </a:p>
@@ -3563,7 +3545,7 @@
             <a:fld id="{B61BEF0D-F0BB-DE4B-95CE-6DB70DBA9567}" type="datetimeFigureOut">
               <a:rPr lang="en-US" dirty="0"/>
               <a:pPr/>
-              <a:t>5/16/2019</a:t>
+              <a:t>18-May-19</a:t>
             </a:fld>
             <a:endParaRPr lang="en-US" dirty="0"/>
           </a:p>
@@ -3807,7 +3789,7 @@
             <a:fld id="{B61BEF0D-F0BB-DE4B-95CE-6DB70DBA9567}" type="datetimeFigureOut">
               <a:rPr lang="en-US" dirty="0"/>
               <a:pPr/>
-              <a:t>5/16/2019</a:t>
+              <a:t>18-May-19</a:t>
             </a:fld>
             <a:endParaRPr lang="en-US" dirty="0"/>
           </a:p>
@@ -4035,7 +4017,7 @@
           <a:p>
             <a:fld id="{EB712588-04B1-427B-82EE-E8DB90309F08}" type="datetimeFigureOut">
               <a:rPr lang="en-US" dirty="0"/>
-              <a:t>5/16/2019</a:t>
+              <a:t>18-May-19</a:t>
             </a:fld>
             <a:endParaRPr lang="en-US" dirty="0"/>
           </a:p>
@@ -4405,7 +4387,7 @@
             <a:fld id="{B61BEF0D-F0BB-DE4B-95CE-6DB70DBA9567}" type="datetimeFigureOut">
               <a:rPr lang="en-US" dirty="0"/>
               <a:pPr/>
-              <a:t>5/16/2019</a:t>
+              <a:t>18-May-19</a:t>
             </a:fld>
             <a:endParaRPr lang="en-US" dirty="0"/>
           </a:p>
@@ -4525,7 +4507,7 @@
             <a:fld id="{B61BEF0D-F0BB-DE4B-95CE-6DB70DBA9567}" type="datetimeFigureOut">
               <a:rPr lang="en-US" dirty="0"/>
               <a:pPr/>
-              <a:t>5/16/2019</a:t>
+              <a:t>18-May-19</a:t>
             </a:fld>
             <a:endParaRPr lang="en-US" dirty="0"/>
           </a:p>
@@ -4617,7 +4599,7 @@
             <a:fld id="{B61BEF0D-F0BB-DE4B-95CE-6DB70DBA9567}" type="datetimeFigureOut">
               <a:rPr lang="en-US" dirty="0"/>
               <a:pPr/>
-              <a:t>5/16/2019</a:t>
+              <a:t>18-May-19</a:t>
             </a:fld>
             <a:endParaRPr lang="en-US" dirty="0"/>
           </a:p>
@@ -4868,7 +4850,7 @@
           <a:p>
             <a:fld id="{42A54C80-263E-416B-A8E0-580EDEADCBDC}" type="datetimeFigureOut">
               <a:rPr lang="en-US" dirty="0"/>
-              <a:t>5/16/2019</a:t>
+              <a:t>18-May-19</a:t>
             </a:fld>
             <a:endParaRPr lang="en-US" dirty="0"/>
           </a:p>
@@ -5127,7 +5109,7 @@
             <a:fld id="{B61BEF0D-F0BB-DE4B-95CE-6DB70DBA9567}" type="datetimeFigureOut">
               <a:rPr lang="en-US" dirty="0"/>
               <a:pPr/>
-              <a:t>5/16/2019</a:t>
+              <a:t>18-May-19</a:t>
             </a:fld>
             <a:endParaRPr lang="en-US" dirty="0"/>
           </a:p>
@@ -5867,7 +5849,7 @@
             <a:fld id="{B61BEF0D-F0BB-DE4B-95CE-6DB70DBA9567}" type="datetimeFigureOut">
               <a:rPr lang="en-US" dirty="0"/>
               <a:pPr/>
-              <a:t>5/16/2019</a:t>
+              <a:t>18-May-19</a:t>
             </a:fld>
             <a:endParaRPr lang="en-US" dirty="0"/>
           </a:p>
@@ -8485,785 +8467,6 @@
           <a:p>
             <a:r>
               <a:rPr lang="en-US" dirty="0" smtClean="0"/>
-              <a:t>View additional settings</a:t>
-            </a:r>
-            <a:endParaRPr lang="en-US" dirty="0"/>
-          </a:p>
-        </p:txBody>
-      </p:sp>
-      <p:sp>
-        <p:nvSpPr>
-          <p:cNvPr id="3" name="Content Placeholder 2"/>
-          <p:cNvSpPr>
-            <a:spLocks noGrp="1"/>
-          </p:cNvSpPr>
-          <p:nvPr>
-            <p:ph idx="1"/>
-          </p:nvPr>
-        </p:nvSpPr>
-        <p:spPr>
-          <a:xfrm>
-            <a:off x="677334" y="1474789"/>
-            <a:ext cx="8596668" cy="3880773"/>
-          </a:xfrm>
-        </p:spPr>
-        <p:txBody>
-          <a:bodyPr/>
-          <a:lstStyle/>
-          <a:p>
-            <a:r>
-              <a:rPr lang="en-US" b="1" dirty="0" smtClean="0"/>
-              <a:t>WITH </a:t>
-            </a:r>
-            <a:r>
-              <a:rPr lang="en-US" b="1" dirty="0"/>
-              <a:t>SCHEMABINDING </a:t>
-            </a:r>
-            <a:r>
-              <a:rPr lang="en-US" dirty="0" smtClean="0"/>
-              <a:t>– option guarantees that </a:t>
-            </a:r>
-            <a:r>
-              <a:rPr lang="en-US" dirty="0"/>
-              <a:t>the underlying table structures cannot be altered without dropping the view</a:t>
-            </a:r>
-          </a:p>
-          <a:p>
-            <a:r>
-              <a:rPr lang="en-US" dirty="0" smtClean="0"/>
-              <a:t>To </a:t>
-            </a:r>
-            <a:r>
-              <a:rPr lang="en-US" dirty="0"/>
-              <a:t>create a view, you name the view and then specify the SELECT statement that </a:t>
-            </a:r>
-            <a:r>
-              <a:rPr lang="en-US" dirty="0" smtClean="0"/>
-              <a:t>will constitute </a:t>
-            </a:r>
-            <a:r>
-              <a:rPr lang="en-US" dirty="0"/>
-              <a:t>the view</a:t>
-            </a:r>
-            <a:r>
-              <a:rPr lang="en-US" dirty="0" smtClean="0"/>
-              <a:t>.</a:t>
-            </a:r>
-          </a:p>
-          <a:p>
-            <a:r>
-              <a:rPr lang="en-US" dirty="0" smtClean="0"/>
-              <a:t>Example:</a:t>
-            </a:r>
-          </a:p>
-          <a:p>
-            <a:endParaRPr lang="en-US" dirty="0" smtClean="0"/>
-          </a:p>
-          <a:p>
-            <a:endParaRPr lang="en-US" dirty="0"/>
-          </a:p>
-        </p:txBody>
-      </p:sp>
-      <p:sp>
-        <p:nvSpPr>
-          <p:cNvPr id="6" name="Rectangle 5"/>
-          <p:cNvSpPr/>
-          <p:nvPr/>
-        </p:nvSpPr>
-        <p:spPr>
-          <a:xfrm>
-            <a:off x="1027176" y="3182773"/>
-            <a:ext cx="6096000" cy="1754326"/>
-          </a:xfrm>
-          <a:prstGeom prst="rect">
-            <a:avLst/>
-          </a:prstGeom>
-        </p:spPr>
-        <p:txBody>
-          <a:bodyPr>
-            <a:spAutoFit/>
-          </a:bodyPr>
-          <a:lstStyle/>
-          <a:p>
-            <a:r>
-              <a:rPr lang="en-US" dirty="0">
-                <a:solidFill>
-                  <a:srgbClr val="0000FF"/>
-                </a:solidFill>
-                <a:latin typeface="Consolas" panose="020B0609020204030204" pitchFamily="49" charset="0"/>
-              </a:rPr>
-              <a:t>CREATE</a:t>
-            </a:r>
-            <a:r>
-              <a:rPr lang="en-US" dirty="0">
-                <a:solidFill>
-                  <a:srgbClr val="000000"/>
-                </a:solidFill>
-                <a:latin typeface="Consolas" panose="020B0609020204030204" pitchFamily="49" charset="0"/>
-              </a:rPr>
-              <a:t> </a:t>
-            </a:r>
-            <a:r>
-              <a:rPr lang="en-US" dirty="0">
-                <a:solidFill>
-                  <a:srgbClr val="0000FF"/>
-                </a:solidFill>
-                <a:latin typeface="Consolas" panose="020B0609020204030204" pitchFamily="49" charset="0"/>
-              </a:rPr>
-              <a:t>VIEW</a:t>
-            </a:r>
-            <a:r>
-              <a:rPr lang="en-US" dirty="0">
-                <a:solidFill>
-                  <a:srgbClr val="000000"/>
-                </a:solidFill>
-                <a:latin typeface="Consolas" panose="020B0609020204030204" pitchFamily="49" charset="0"/>
-              </a:rPr>
-              <a:t> </a:t>
-            </a:r>
-            <a:r>
-              <a:rPr lang="en-US" dirty="0" err="1">
-                <a:solidFill>
-                  <a:srgbClr val="000000"/>
-                </a:solidFill>
-                <a:latin typeface="Consolas" panose="020B0609020204030204" pitchFamily="49" charset="0"/>
-              </a:rPr>
-              <a:t>MaleEmployees</a:t>
-            </a:r>
-            <a:endParaRPr lang="en-US" dirty="0">
-              <a:solidFill>
-                <a:srgbClr val="000000"/>
-              </a:solidFill>
-              <a:latin typeface="Consolas" panose="020B0609020204030204" pitchFamily="49" charset="0"/>
-            </a:endParaRPr>
-          </a:p>
-          <a:p>
-            <a:r>
-              <a:rPr lang="en-US" dirty="0">
-                <a:solidFill>
-                  <a:srgbClr val="0000FF"/>
-                </a:solidFill>
-                <a:latin typeface="Consolas" panose="020B0609020204030204" pitchFamily="49" charset="0"/>
-              </a:rPr>
-              <a:t>WITH</a:t>
-            </a:r>
-            <a:r>
-              <a:rPr lang="en-US" dirty="0">
-                <a:solidFill>
-                  <a:srgbClr val="000000"/>
-                </a:solidFill>
-                <a:latin typeface="Consolas" panose="020B0609020204030204" pitchFamily="49" charset="0"/>
-              </a:rPr>
-              <a:t> </a:t>
-            </a:r>
-            <a:r>
-              <a:rPr lang="en-US" dirty="0">
-                <a:solidFill>
-                  <a:srgbClr val="0000FF"/>
-                </a:solidFill>
-                <a:latin typeface="Consolas" panose="020B0609020204030204" pitchFamily="49" charset="0"/>
-              </a:rPr>
-              <a:t>SCHEMABINDING</a:t>
-            </a:r>
-            <a:endParaRPr lang="en-US" dirty="0">
-              <a:solidFill>
-                <a:srgbClr val="000000"/>
-              </a:solidFill>
-              <a:latin typeface="Consolas" panose="020B0609020204030204" pitchFamily="49" charset="0"/>
-            </a:endParaRPr>
-          </a:p>
-          <a:p>
-            <a:r>
-              <a:rPr lang="en-US" dirty="0">
-                <a:solidFill>
-                  <a:srgbClr val="0000FF"/>
-                </a:solidFill>
-                <a:latin typeface="Consolas" panose="020B0609020204030204" pitchFamily="49" charset="0"/>
-              </a:rPr>
-              <a:t>AS</a:t>
-            </a:r>
-            <a:endParaRPr lang="en-US" dirty="0">
-              <a:solidFill>
-                <a:srgbClr val="000000"/>
-              </a:solidFill>
-              <a:latin typeface="Consolas" panose="020B0609020204030204" pitchFamily="49" charset="0"/>
-            </a:endParaRPr>
-          </a:p>
-          <a:p>
-            <a:r>
-              <a:rPr lang="en-US" dirty="0">
-                <a:solidFill>
-                  <a:srgbClr val="0000FF"/>
-                </a:solidFill>
-                <a:latin typeface="Consolas" panose="020B0609020204030204" pitchFamily="49" charset="0"/>
-              </a:rPr>
-              <a:t>SELECT</a:t>
-            </a:r>
-            <a:r>
-              <a:rPr lang="en-US" dirty="0">
-                <a:solidFill>
-                  <a:srgbClr val="000000"/>
-                </a:solidFill>
-                <a:latin typeface="Consolas" panose="020B0609020204030204" pitchFamily="49" charset="0"/>
-              </a:rPr>
-              <a:t> </a:t>
-            </a:r>
-            <a:r>
-              <a:rPr lang="en-US" dirty="0"/>
-              <a:t>Id</a:t>
-            </a:r>
-            <a:r>
-              <a:rPr lang="en-US" dirty="0" smtClean="0"/>
-              <a:t>, </a:t>
-            </a:r>
-            <a:r>
-              <a:rPr lang="en-US" dirty="0" err="1" smtClean="0">
-                <a:solidFill>
-                  <a:srgbClr val="000000"/>
-                </a:solidFill>
-                <a:latin typeface="Consolas" panose="020B0609020204030204" pitchFamily="49" charset="0"/>
-              </a:rPr>
-              <a:t>FirstName</a:t>
-            </a:r>
-            <a:r>
-              <a:rPr lang="en-US" dirty="0" err="1" smtClean="0">
-                <a:solidFill>
-                  <a:srgbClr val="808080"/>
-                </a:solidFill>
-                <a:latin typeface="Consolas" panose="020B0609020204030204" pitchFamily="49" charset="0"/>
-              </a:rPr>
-              <a:t>,</a:t>
-            </a:r>
-            <a:r>
-              <a:rPr lang="en-US" dirty="0" err="1" smtClean="0">
-                <a:solidFill>
-                  <a:srgbClr val="000000"/>
-                </a:solidFill>
-                <a:latin typeface="Consolas" panose="020B0609020204030204" pitchFamily="49" charset="0"/>
-              </a:rPr>
-              <a:t>LastName</a:t>
-            </a:r>
-            <a:r>
-              <a:rPr lang="en-US" dirty="0" err="1" smtClean="0">
-                <a:solidFill>
-                  <a:srgbClr val="808080"/>
-                </a:solidFill>
-                <a:latin typeface="Consolas" panose="020B0609020204030204" pitchFamily="49" charset="0"/>
-              </a:rPr>
-              <a:t>,</a:t>
-            </a:r>
-            <a:r>
-              <a:rPr lang="en-US" dirty="0" err="1" smtClean="0">
-                <a:solidFill>
-                  <a:srgbClr val="000000"/>
-                </a:solidFill>
-                <a:latin typeface="Consolas" panose="020B0609020204030204" pitchFamily="49" charset="0"/>
-              </a:rPr>
-              <a:t>HireDate</a:t>
-            </a:r>
-            <a:r>
-              <a:rPr lang="en-US" dirty="0" smtClean="0">
-                <a:solidFill>
-                  <a:srgbClr val="000000"/>
-                </a:solidFill>
-                <a:latin typeface="Consolas" panose="020B0609020204030204" pitchFamily="49" charset="0"/>
-              </a:rPr>
-              <a:t> </a:t>
-            </a:r>
-            <a:endParaRPr lang="en-US" dirty="0">
-              <a:solidFill>
-                <a:srgbClr val="000000"/>
-              </a:solidFill>
-              <a:latin typeface="Consolas" panose="020B0609020204030204" pitchFamily="49" charset="0"/>
-            </a:endParaRPr>
-          </a:p>
-          <a:p>
-            <a:r>
-              <a:rPr lang="en-US" dirty="0">
-                <a:solidFill>
-                  <a:srgbClr val="0000FF"/>
-                </a:solidFill>
-                <a:latin typeface="Consolas" panose="020B0609020204030204" pitchFamily="49" charset="0"/>
-              </a:rPr>
-              <a:t>FROM</a:t>
-            </a:r>
-            <a:r>
-              <a:rPr lang="en-US" dirty="0">
-                <a:solidFill>
-                  <a:srgbClr val="000000"/>
-                </a:solidFill>
-                <a:latin typeface="Consolas" panose="020B0609020204030204" pitchFamily="49" charset="0"/>
-              </a:rPr>
-              <a:t> </a:t>
-            </a:r>
-            <a:r>
-              <a:rPr lang="en-US" dirty="0" err="1">
-                <a:solidFill>
-                  <a:srgbClr val="000000"/>
-                </a:solidFill>
-                <a:latin typeface="Consolas" panose="020B0609020204030204" pitchFamily="49" charset="0"/>
-              </a:rPr>
-              <a:t>dbo</a:t>
-            </a:r>
-            <a:r>
-              <a:rPr lang="en-US" dirty="0" err="1">
-                <a:solidFill>
-                  <a:srgbClr val="808080"/>
-                </a:solidFill>
-                <a:latin typeface="Consolas" panose="020B0609020204030204" pitchFamily="49" charset="0"/>
-              </a:rPr>
-              <a:t>.</a:t>
-            </a:r>
-            <a:r>
-              <a:rPr lang="en-US" dirty="0" err="1">
-                <a:solidFill>
-                  <a:srgbClr val="000000"/>
-                </a:solidFill>
-                <a:latin typeface="Consolas" panose="020B0609020204030204" pitchFamily="49" charset="0"/>
-              </a:rPr>
-              <a:t>Employee</a:t>
-            </a:r>
-            <a:endParaRPr lang="en-US" dirty="0">
-              <a:solidFill>
-                <a:srgbClr val="000000"/>
-              </a:solidFill>
-              <a:latin typeface="Consolas" panose="020B0609020204030204" pitchFamily="49" charset="0"/>
-            </a:endParaRPr>
-          </a:p>
-          <a:p>
-            <a:r>
-              <a:rPr lang="en-US" dirty="0">
-                <a:solidFill>
-                  <a:srgbClr val="0000FF"/>
-                </a:solidFill>
-                <a:latin typeface="Consolas" panose="020B0609020204030204" pitchFamily="49" charset="0"/>
-              </a:rPr>
-              <a:t>WHERE</a:t>
-            </a:r>
-            <a:r>
-              <a:rPr lang="en-US" dirty="0">
-                <a:solidFill>
-                  <a:srgbClr val="000000"/>
-                </a:solidFill>
-                <a:latin typeface="Consolas" panose="020B0609020204030204" pitchFamily="49" charset="0"/>
-              </a:rPr>
-              <a:t> Gender </a:t>
-            </a:r>
-            <a:r>
-              <a:rPr lang="en-US" dirty="0">
-                <a:solidFill>
-                  <a:srgbClr val="808080"/>
-                </a:solidFill>
-                <a:latin typeface="Consolas" panose="020B0609020204030204" pitchFamily="49" charset="0"/>
-              </a:rPr>
-              <a:t>=</a:t>
-            </a:r>
-            <a:r>
-              <a:rPr lang="en-US" dirty="0">
-                <a:solidFill>
-                  <a:srgbClr val="000000"/>
-                </a:solidFill>
-                <a:latin typeface="Consolas" panose="020B0609020204030204" pitchFamily="49" charset="0"/>
-              </a:rPr>
-              <a:t> </a:t>
-            </a:r>
-            <a:r>
-              <a:rPr lang="en-US" dirty="0">
-                <a:solidFill>
-                  <a:srgbClr val="FF0000"/>
-                </a:solidFill>
-                <a:latin typeface="Consolas" panose="020B0609020204030204" pitchFamily="49" charset="0"/>
-              </a:rPr>
-              <a:t>'M'</a:t>
-            </a:r>
-            <a:endParaRPr lang="en-US" dirty="0"/>
-          </a:p>
-        </p:txBody>
-      </p:sp>
-    </p:spTree>
-    <p:extLst>
-      <p:ext uri="{BB962C8B-B14F-4D97-AF65-F5344CB8AC3E}">
-        <p14:creationId xmlns:p14="http://schemas.microsoft.com/office/powerpoint/2010/main" val="4031006431"/>
-      </p:ext>
-    </p:extLst>
-  </p:cSld>
-  <p:clrMapOvr>
-    <a:masterClrMapping/>
-  </p:clrMapOvr>
-</p:sld>
-</file>
-
-<file path=ppt/slides/slide18.xml><?xml version="1.0" encoding="utf-8"?>
-<p:sld xmlns:a="http://schemas.openxmlformats.org/drawingml/2006/main" xmlns:r="http://schemas.openxmlformats.org/officeDocument/2006/relationships" xmlns:p="http://schemas.openxmlformats.org/presentationml/2006/main">
-  <p:cSld>
-    <p:spTree>
-      <p:nvGrpSpPr>
-        <p:cNvPr id="1" name=""/>
-        <p:cNvGrpSpPr/>
-        <p:nvPr/>
-      </p:nvGrpSpPr>
-      <p:grpSpPr>
-        <a:xfrm>
-          <a:off x="0" y="0"/>
-          <a:ext cx="0" cy="0"/>
-          <a:chOff x="0" y="0"/>
-          <a:chExt cx="0" cy="0"/>
-        </a:xfrm>
-      </p:grpSpPr>
-      <p:sp>
-        <p:nvSpPr>
-          <p:cNvPr id="2" name="Title 1"/>
-          <p:cNvSpPr>
-            <a:spLocks noGrp="1"/>
-          </p:cNvSpPr>
-          <p:nvPr>
-            <p:ph type="title"/>
-          </p:nvPr>
-        </p:nvSpPr>
-        <p:spPr/>
-        <p:txBody>
-          <a:bodyPr/>
-          <a:lstStyle/>
-          <a:p>
-            <a:r>
-              <a:rPr lang="en-GB" dirty="0" smtClean="0"/>
-              <a:t>Indexed </a:t>
-            </a:r>
-            <a:r>
-              <a:rPr lang="en-US" dirty="0" smtClean="0"/>
-              <a:t>View</a:t>
-            </a:r>
-            <a:endParaRPr lang="en-US" dirty="0"/>
-          </a:p>
-        </p:txBody>
-      </p:sp>
-      <p:sp>
-        <p:nvSpPr>
-          <p:cNvPr id="3" name="Content Placeholder 2"/>
-          <p:cNvSpPr>
-            <a:spLocks noGrp="1"/>
-          </p:cNvSpPr>
-          <p:nvPr>
-            <p:ph idx="1"/>
-          </p:nvPr>
-        </p:nvSpPr>
-        <p:spPr>
-          <a:xfrm>
-            <a:off x="677334" y="1474789"/>
-            <a:ext cx="8596668" cy="3880773"/>
-          </a:xfrm>
-        </p:spPr>
-        <p:txBody>
-          <a:bodyPr>
-            <a:normAutofit/>
-          </a:bodyPr>
-          <a:lstStyle/>
-          <a:p>
-            <a:r>
-              <a:rPr lang="en-US" dirty="0" smtClean="0"/>
-              <a:t>View </a:t>
-            </a:r>
-            <a:r>
-              <a:rPr lang="en-US" dirty="0"/>
-              <a:t>is just a definition by a SELECT statement of how the results should be </a:t>
-            </a:r>
-            <a:r>
-              <a:rPr lang="en-US" dirty="0" smtClean="0"/>
-              <a:t>built - no </a:t>
-            </a:r>
-            <a:r>
-              <a:rPr lang="en-US" dirty="0"/>
-              <a:t>data is </a:t>
-            </a:r>
-            <a:r>
-              <a:rPr lang="en-US" dirty="0" smtClean="0"/>
-              <a:t>stored</a:t>
-            </a:r>
-          </a:p>
-          <a:p>
-            <a:r>
-              <a:rPr lang="en-GB" dirty="0" smtClean="0"/>
-              <a:t>It is possible to create view that will keep copy of the data included in the view – it is called indexed view</a:t>
-            </a:r>
-          </a:p>
-          <a:p>
-            <a:r>
-              <a:rPr lang="en-GB" dirty="0" smtClean="0"/>
-              <a:t>Reasons for indexing view:</a:t>
-            </a:r>
-          </a:p>
-          <a:p>
-            <a:pPr lvl="1"/>
-            <a:r>
-              <a:rPr lang="en-GB" dirty="0" smtClean="0"/>
-              <a:t>Improve performance of the query</a:t>
-            </a:r>
-          </a:p>
-          <a:p>
-            <a:r>
-              <a:rPr lang="en-GB" dirty="0" smtClean="0"/>
-              <a:t>Limitations:</a:t>
-            </a:r>
-          </a:p>
-          <a:p>
-            <a:pPr lvl="1"/>
-            <a:r>
-              <a:rPr lang="en-US" dirty="0" smtClean="0"/>
-              <a:t>T-SQL can’t contain COUNT</a:t>
-            </a:r>
-            <a:r>
-              <a:rPr lang="en-US" dirty="0"/>
-              <a:t>, MIN, MAX, TOP, outer </a:t>
-            </a:r>
-            <a:r>
-              <a:rPr lang="en-US" dirty="0" smtClean="0"/>
-              <a:t>joins</a:t>
-            </a:r>
-            <a:endParaRPr lang="en-US" dirty="0"/>
-          </a:p>
-          <a:p>
-            <a:endParaRPr lang="en-US" dirty="0" smtClean="0"/>
-          </a:p>
-          <a:p>
-            <a:r>
-              <a:rPr lang="en-US" dirty="0" smtClean="0"/>
-              <a:t>How to index the view:</a:t>
-            </a:r>
-          </a:p>
-          <a:p>
-            <a:endParaRPr lang="en-US" dirty="0" smtClean="0"/>
-          </a:p>
-          <a:p>
-            <a:endParaRPr lang="en-US" dirty="0" smtClean="0"/>
-          </a:p>
-          <a:p>
-            <a:endParaRPr lang="en-US" dirty="0"/>
-          </a:p>
-        </p:txBody>
-      </p:sp>
-      <p:sp>
-        <p:nvSpPr>
-          <p:cNvPr id="4" name="Rectangle 3"/>
-          <p:cNvSpPr/>
-          <p:nvPr/>
-        </p:nvSpPr>
-        <p:spPr>
-          <a:xfrm>
-            <a:off x="1036320" y="4893897"/>
-            <a:ext cx="6096000" cy="923330"/>
-          </a:xfrm>
-          <a:prstGeom prst="rect">
-            <a:avLst/>
-          </a:prstGeom>
-        </p:spPr>
-        <p:txBody>
-          <a:bodyPr>
-            <a:spAutoFit/>
-          </a:bodyPr>
-          <a:lstStyle/>
-          <a:p>
-            <a:endParaRPr lang="en-US" dirty="0">
-              <a:solidFill>
-                <a:srgbClr val="000000"/>
-              </a:solidFill>
-              <a:latin typeface="Consolas" panose="020B0609020204030204" pitchFamily="49" charset="0"/>
-            </a:endParaRPr>
-          </a:p>
-          <a:p>
-            <a:r>
-              <a:rPr lang="en-US" dirty="0">
-                <a:solidFill>
-                  <a:srgbClr val="0000FF"/>
-                </a:solidFill>
-                <a:latin typeface="Consolas" panose="020B0609020204030204" pitchFamily="49" charset="0"/>
-              </a:rPr>
-              <a:t>CREATE</a:t>
-            </a:r>
-            <a:r>
-              <a:rPr lang="en-US" dirty="0">
-                <a:solidFill>
-                  <a:srgbClr val="000000"/>
-                </a:solidFill>
-                <a:latin typeface="Consolas" panose="020B0609020204030204" pitchFamily="49" charset="0"/>
-              </a:rPr>
-              <a:t> </a:t>
-            </a:r>
-            <a:r>
-              <a:rPr lang="en-US" dirty="0">
-                <a:solidFill>
-                  <a:srgbClr val="0000FF"/>
-                </a:solidFill>
-                <a:latin typeface="Consolas" panose="020B0609020204030204" pitchFamily="49" charset="0"/>
-              </a:rPr>
-              <a:t>UNIQUE</a:t>
-            </a:r>
-            <a:r>
-              <a:rPr lang="en-US" dirty="0">
-                <a:solidFill>
-                  <a:srgbClr val="000000"/>
-                </a:solidFill>
-                <a:latin typeface="Consolas" panose="020B0609020204030204" pitchFamily="49" charset="0"/>
-              </a:rPr>
-              <a:t> </a:t>
-            </a:r>
-            <a:r>
-              <a:rPr lang="en-US" dirty="0">
-                <a:solidFill>
-                  <a:srgbClr val="0000FF"/>
-                </a:solidFill>
-                <a:latin typeface="Consolas" panose="020B0609020204030204" pitchFamily="49" charset="0"/>
-              </a:rPr>
-              <a:t>CLUSTERED</a:t>
-            </a:r>
-            <a:r>
-              <a:rPr lang="en-US" dirty="0">
-                <a:solidFill>
-                  <a:srgbClr val="000000"/>
-                </a:solidFill>
-                <a:latin typeface="Consolas" panose="020B0609020204030204" pitchFamily="49" charset="0"/>
-              </a:rPr>
-              <a:t> </a:t>
-            </a:r>
-            <a:r>
-              <a:rPr lang="en-US" dirty="0">
-                <a:solidFill>
-                  <a:srgbClr val="0000FF"/>
-                </a:solidFill>
-                <a:latin typeface="Consolas" panose="020B0609020204030204" pitchFamily="49" charset="0"/>
-              </a:rPr>
-              <a:t>INDEX</a:t>
-            </a:r>
-            <a:r>
-              <a:rPr lang="en-US" dirty="0">
-                <a:solidFill>
-                  <a:srgbClr val="000000"/>
-                </a:solidFill>
-                <a:latin typeface="Consolas" panose="020B0609020204030204" pitchFamily="49" charset="0"/>
-              </a:rPr>
-              <a:t> </a:t>
-            </a:r>
-            <a:r>
-              <a:rPr lang="en-US" dirty="0" err="1">
-                <a:solidFill>
-                  <a:srgbClr val="000000"/>
-                </a:solidFill>
-                <a:latin typeface="Consolas" panose="020B0609020204030204" pitchFamily="49" charset="0"/>
-              </a:rPr>
-              <a:t>ix_MaleEmployees</a:t>
-            </a:r>
-            <a:endParaRPr lang="en-US" dirty="0">
-              <a:solidFill>
-                <a:srgbClr val="000000"/>
-              </a:solidFill>
-              <a:latin typeface="Consolas" panose="020B0609020204030204" pitchFamily="49" charset="0"/>
-            </a:endParaRPr>
-          </a:p>
-          <a:p>
-            <a:r>
-              <a:rPr lang="en-US" dirty="0">
-                <a:solidFill>
-                  <a:srgbClr val="0000FF"/>
-                </a:solidFill>
-                <a:latin typeface="Consolas" panose="020B0609020204030204" pitchFamily="49" charset="0"/>
-              </a:rPr>
-              <a:t>ON</a:t>
-            </a:r>
-            <a:r>
-              <a:rPr lang="en-US" dirty="0">
-                <a:solidFill>
-                  <a:srgbClr val="000000"/>
-                </a:solidFill>
-                <a:latin typeface="Consolas" panose="020B0609020204030204" pitchFamily="49" charset="0"/>
-              </a:rPr>
-              <a:t> </a:t>
-            </a:r>
-            <a:r>
-              <a:rPr lang="en-US" dirty="0" err="1">
-                <a:solidFill>
-                  <a:srgbClr val="000000"/>
-                </a:solidFill>
-                <a:latin typeface="Consolas" panose="020B0609020204030204" pitchFamily="49" charset="0"/>
-              </a:rPr>
-              <a:t>MaleEmployees</a:t>
-            </a:r>
-            <a:r>
-              <a:rPr lang="en-US" dirty="0">
-                <a:solidFill>
-                  <a:srgbClr val="808080"/>
-                </a:solidFill>
-                <a:latin typeface="Consolas" panose="020B0609020204030204" pitchFamily="49" charset="0"/>
-              </a:rPr>
-              <a:t>(</a:t>
-            </a:r>
-            <a:r>
-              <a:rPr lang="en-US" dirty="0">
-                <a:solidFill>
-                  <a:srgbClr val="000000"/>
-                </a:solidFill>
-                <a:latin typeface="Consolas" panose="020B0609020204030204" pitchFamily="49" charset="0"/>
-              </a:rPr>
-              <a:t>Id</a:t>
-            </a:r>
-            <a:r>
-              <a:rPr lang="en-US" dirty="0">
-                <a:solidFill>
-                  <a:srgbClr val="808080"/>
-                </a:solidFill>
-                <a:latin typeface="Consolas" panose="020B0609020204030204" pitchFamily="49" charset="0"/>
-              </a:rPr>
-              <a:t>)</a:t>
-            </a:r>
-            <a:endParaRPr lang="en-US" dirty="0"/>
-          </a:p>
-        </p:txBody>
-      </p:sp>
-    </p:spTree>
-    <p:extLst>
-      <p:ext uri="{BB962C8B-B14F-4D97-AF65-F5344CB8AC3E}">
-        <p14:creationId xmlns:p14="http://schemas.microsoft.com/office/powerpoint/2010/main" val="906236389"/>
-      </p:ext>
-    </p:extLst>
-  </p:cSld>
-  <p:clrMapOvr>
-    <a:masterClrMapping/>
-  </p:clrMapOvr>
-</p:sld>
-</file>
-
-<file path=ppt/slides/slide19.xml><?xml version="1.0" encoding="utf-8"?>
-<p:sld xmlns:a="http://schemas.openxmlformats.org/drawingml/2006/main" xmlns:r="http://schemas.openxmlformats.org/officeDocument/2006/relationships" xmlns:p="http://schemas.openxmlformats.org/presentationml/2006/main">
-  <p:cSld>
-    <p:spTree>
-      <p:nvGrpSpPr>
-        <p:cNvPr id="1" name=""/>
-        <p:cNvGrpSpPr/>
-        <p:nvPr/>
-      </p:nvGrpSpPr>
-      <p:grpSpPr>
-        <a:xfrm>
-          <a:off x="0" y="0"/>
-          <a:ext cx="0" cy="0"/>
-          <a:chOff x="0" y="0"/>
-          <a:chExt cx="0" cy="0"/>
-        </a:xfrm>
-      </p:grpSpPr>
-      <p:sp>
-        <p:nvSpPr>
-          <p:cNvPr id="2" name="Title 1"/>
-          <p:cNvSpPr>
-            <a:spLocks noGrp="1"/>
-          </p:cNvSpPr>
-          <p:nvPr>
-            <p:ph type="title"/>
-          </p:nvPr>
-        </p:nvSpPr>
-        <p:spPr/>
-        <p:txBody>
-          <a:bodyPr/>
-          <a:lstStyle/>
-          <a:p>
-            <a:r>
-              <a:rPr lang="en-US" dirty="0" smtClean="0"/>
               <a:t>Views - Workshop</a:t>
             </a:r>
             <a:endParaRPr lang="en-US" dirty="0"/>
@@ -9443,6 +8646,413 @@
 </p:sld>
 </file>
 
+<file path=ppt/slides/slide18.xml><?xml version="1.0" encoding="utf-8"?>
+<p:sld xmlns:a="http://schemas.openxmlformats.org/drawingml/2006/main" xmlns:r="http://schemas.openxmlformats.org/officeDocument/2006/relationships" xmlns:p="http://schemas.openxmlformats.org/presentationml/2006/main">
+  <p:cSld>
+    <p:spTree>
+      <p:nvGrpSpPr>
+        <p:cNvPr id="1" name=""/>
+        <p:cNvGrpSpPr/>
+        <p:nvPr/>
+      </p:nvGrpSpPr>
+      <p:grpSpPr>
+        <a:xfrm>
+          <a:off x="0" y="0"/>
+          <a:ext cx="0" cy="0"/>
+          <a:chOff x="0" y="0"/>
+          <a:chExt cx="0" cy="0"/>
+        </a:xfrm>
+      </p:grpSpPr>
+      <p:sp>
+        <p:nvSpPr>
+          <p:cNvPr id="4" name="Title 3"/>
+          <p:cNvSpPr>
+            <a:spLocks noGrp="1"/>
+          </p:cNvSpPr>
+          <p:nvPr>
+            <p:ph type="title"/>
+          </p:nvPr>
+        </p:nvSpPr>
+        <p:spPr/>
+        <p:txBody>
+          <a:bodyPr/>
+          <a:lstStyle/>
+          <a:p>
+            <a:r>
+              <a:rPr lang="en-US" dirty="0" smtClean="0"/>
+              <a:t>Knowledge check</a:t>
+            </a:r>
+            <a:endParaRPr lang="en-US" dirty="0"/>
+          </a:p>
+        </p:txBody>
+      </p:sp>
+      <p:sp>
+        <p:nvSpPr>
+          <p:cNvPr id="2" name="Text Placeholder 1"/>
+          <p:cNvSpPr>
+            <a:spLocks noGrp="1"/>
+          </p:cNvSpPr>
+          <p:nvPr>
+            <p:ph type="body" idx="1"/>
+          </p:nvPr>
+        </p:nvSpPr>
+        <p:spPr/>
+        <p:txBody>
+          <a:bodyPr/>
+          <a:lstStyle/>
+          <a:p>
+            <a:r>
+              <a:rPr lang="en-US" dirty="0"/>
+              <a:t>Quiz, Discussion, Homework</a:t>
+            </a:r>
+          </a:p>
+        </p:txBody>
+      </p:sp>
+    </p:spTree>
+    <p:extLst>
+      <p:ext uri="{BB962C8B-B14F-4D97-AF65-F5344CB8AC3E}">
+        <p14:creationId xmlns:p14="http://schemas.microsoft.com/office/powerpoint/2010/main" val="2257886123"/>
+      </p:ext>
+    </p:extLst>
+  </p:cSld>
+  <p:clrMapOvr>
+    <a:masterClrMapping/>
+  </p:clrMapOvr>
+  <p:timing>
+    <p:tnLst>
+      <p:par>
+        <p:cTn id="1" dur="indefinite" restart="never" nodeType="tmRoot"/>
+      </p:par>
+    </p:tnLst>
+  </p:timing>
+</p:sld>
+</file>
+
+<file path=ppt/slides/slide19.xml><?xml version="1.0" encoding="utf-8"?>
+<p:sld xmlns:a="http://schemas.openxmlformats.org/drawingml/2006/main" xmlns:r="http://schemas.openxmlformats.org/officeDocument/2006/relationships" xmlns:p="http://schemas.openxmlformats.org/presentationml/2006/main">
+  <p:cSld>
+    <p:spTree>
+      <p:nvGrpSpPr>
+        <p:cNvPr id="1" name=""/>
+        <p:cNvGrpSpPr/>
+        <p:nvPr/>
+      </p:nvGrpSpPr>
+      <p:grpSpPr>
+        <a:xfrm>
+          <a:off x="0" y="0"/>
+          <a:ext cx="0" cy="0"/>
+          <a:chOff x="0" y="0"/>
+          <a:chExt cx="0" cy="0"/>
+        </a:xfrm>
+      </p:grpSpPr>
+      <p:sp>
+        <p:nvSpPr>
+          <p:cNvPr id="2" name="Title 1"/>
+          <p:cNvSpPr>
+            <a:spLocks noGrp="1"/>
+          </p:cNvSpPr>
+          <p:nvPr>
+            <p:ph type="title"/>
+          </p:nvPr>
+        </p:nvSpPr>
+        <p:spPr>
+          <a:xfrm>
+            <a:off x="677334" y="609600"/>
+            <a:ext cx="8596668" cy="768439"/>
+          </a:xfrm>
+        </p:spPr>
+        <p:txBody>
+          <a:bodyPr/>
+          <a:lstStyle/>
+          <a:p>
+            <a:r>
+              <a:rPr lang="en-US" dirty="0" smtClean="0"/>
+              <a:t>Quiz</a:t>
+            </a:r>
+            <a:endParaRPr lang="en-US" dirty="0"/>
+          </a:p>
+        </p:txBody>
+      </p:sp>
+      <p:sp>
+        <p:nvSpPr>
+          <p:cNvPr id="3" name="Content Placeholder 2"/>
+          <p:cNvSpPr>
+            <a:spLocks noGrp="1"/>
+          </p:cNvSpPr>
+          <p:nvPr>
+            <p:ph idx="1"/>
+          </p:nvPr>
+        </p:nvSpPr>
+        <p:spPr>
+          <a:xfrm>
+            <a:off x="677334" y="1378039"/>
+            <a:ext cx="8596668" cy="5203065"/>
+          </a:xfrm>
+        </p:spPr>
+        <p:txBody>
+          <a:bodyPr>
+            <a:normAutofit fontScale="85000" lnSpcReduction="10000"/>
+          </a:bodyPr>
+          <a:lstStyle/>
+          <a:p>
+            <a:r>
+              <a:rPr lang="en-US" dirty="0" smtClean="0"/>
+              <a:t>Can we assign multiple values to scalar variable?</a:t>
+            </a:r>
+            <a:endParaRPr lang="en-US" dirty="0"/>
+          </a:p>
+          <a:p>
+            <a:pPr marL="457200" lvl="1" indent="0">
+              <a:buNone/>
+            </a:pPr>
+            <a:r>
+              <a:rPr lang="en-US" b="1" dirty="0" smtClean="0"/>
+              <a:t>a.</a:t>
+            </a:r>
+            <a:r>
+              <a:rPr lang="en-US" dirty="0"/>
+              <a:t> </a:t>
+            </a:r>
+            <a:r>
+              <a:rPr lang="en-US" dirty="0" smtClean="0"/>
+              <a:t>Yes</a:t>
+            </a:r>
+            <a:endParaRPr lang="en-US" dirty="0"/>
+          </a:p>
+          <a:p>
+            <a:pPr marL="457200" lvl="1" indent="0">
+              <a:buNone/>
+            </a:pPr>
+            <a:r>
+              <a:rPr lang="en-US" b="1" dirty="0" smtClean="0"/>
+              <a:t>b. </a:t>
+            </a:r>
+            <a:r>
+              <a:rPr lang="en-US" dirty="0" smtClean="0"/>
+              <a:t>No</a:t>
+            </a:r>
+          </a:p>
+          <a:p>
+            <a:r>
+              <a:rPr lang="en-US" dirty="0"/>
+              <a:t>Can we </a:t>
+            </a:r>
+            <a:r>
+              <a:rPr lang="en-US" dirty="0" smtClean="0"/>
+              <a:t>have WHERE operator in the same statement with GROUP BY operator?</a:t>
+            </a:r>
+          </a:p>
+          <a:p>
+            <a:pPr marL="0" indent="0">
+              <a:buNone/>
+            </a:pPr>
+            <a:r>
+              <a:rPr lang="en-US" dirty="0"/>
+              <a:t>	</a:t>
+            </a:r>
+            <a:r>
+              <a:rPr lang="en-US" b="1" dirty="0" smtClean="0"/>
+              <a:t>a</a:t>
+            </a:r>
+            <a:r>
+              <a:rPr lang="en-US" b="1" dirty="0"/>
+              <a:t>.</a:t>
+            </a:r>
+            <a:r>
+              <a:rPr lang="en-US" dirty="0"/>
+              <a:t> Yes</a:t>
+            </a:r>
+          </a:p>
+          <a:p>
+            <a:pPr marL="457200" lvl="1" indent="0">
+              <a:buNone/>
+            </a:pPr>
+            <a:r>
+              <a:rPr lang="en-US" b="1" dirty="0"/>
+              <a:t>b. </a:t>
+            </a:r>
+            <a:r>
+              <a:rPr lang="en-US" dirty="0"/>
+              <a:t>No</a:t>
+            </a:r>
+          </a:p>
+          <a:p>
+            <a:r>
+              <a:rPr lang="en-US" dirty="0" smtClean="0"/>
+              <a:t>Which SQL function is used to determine number of characters in the string?</a:t>
+            </a:r>
+          </a:p>
+          <a:p>
+            <a:pPr marL="457200" lvl="1" indent="0">
+              <a:buNone/>
+            </a:pPr>
+            <a:r>
+              <a:rPr lang="en-US" b="1" dirty="0" smtClean="0"/>
+              <a:t>a</a:t>
+            </a:r>
+            <a:r>
+              <a:rPr lang="en-US" b="1" dirty="0"/>
+              <a:t>. </a:t>
+            </a:r>
+            <a:r>
+              <a:rPr lang="en-US" dirty="0" smtClean="0"/>
+              <a:t>LEFT</a:t>
+            </a:r>
+            <a:endParaRPr lang="en-US" dirty="0"/>
+          </a:p>
+          <a:p>
+            <a:pPr marL="457200" lvl="1" indent="0">
+              <a:buNone/>
+            </a:pPr>
+            <a:r>
+              <a:rPr lang="en-US" b="1" dirty="0"/>
+              <a:t>b. </a:t>
+            </a:r>
+            <a:r>
+              <a:rPr lang="en-US" dirty="0" smtClean="0"/>
+              <a:t>STRING</a:t>
+            </a:r>
+          </a:p>
+          <a:p>
+            <a:pPr marL="457200" lvl="1" indent="0">
+              <a:buNone/>
+            </a:pPr>
+            <a:r>
+              <a:rPr lang="en-US" b="1" dirty="0" smtClean="0"/>
+              <a:t>c. </a:t>
+            </a:r>
+            <a:r>
+              <a:rPr lang="en-US" dirty="0" smtClean="0"/>
+              <a:t>STRING_SIZE</a:t>
+            </a:r>
+          </a:p>
+          <a:p>
+            <a:pPr marL="457200" lvl="1" indent="0">
+              <a:buNone/>
+            </a:pPr>
+            <a:r>
+              <a:rPr lang="en-US" b="1" dirty="0" smtClean="0"/>
+              <a:t>d</a:t>
+            </a:r>
+            <a:r>
+              <a:rPr lang="en-US" b="1" dirty="0"/>
+              <a:t>. </a:t>
+            </a:r>
+            <a:r>
+              <a:rPr lang="en-US" dirty="0" smtClean="0"/>
+              <a:t>LEN</a:t>
+            </a:r>
+          </a:p>
+          <a:p>
+            <a:r>
+              <a:rPr lang="en-US" dirty="0" smtClean="0"/>
+              <a:t>Which SQL function is used to concatenate multiple string records into single value?</a:t>
+            </a:r>
+          </a:p>
+          <a:p>
+            <a:pPr marL="0" indent="0">
+              <a:buNone/>
+            </a:pPr>
+            <a:r>
+              <a:rPr lang="en-US" dirty="0"/>
+              <a:t> </a:t>
+            </a:r>
+            <a:r>
+              <a:rPr lang="en-US" dirty="0" smtClean="0"/>
+              <a:t>      </a:t>
+            </a:r>
+            <a:r>
+              <a:rPr lang="en-US" b="1" dirty="0" smtClean="0"/>
+              <a:t>a</a:t>
+            </a:r>
+            <a:r>
+              <a:rPr lang="en-US" b="1" dirty="0"/>
+              <a:t>.</a:t>
+            </a:r>
+            <a:r>
+              <a:rPr lang="en-US" dirty="0"/>
+              <a:t> </a:t>
+            </a:r>
+            <a:r>
+              <a:rPr lang="en-US" dirty="0" smtClean="0"/>
+              <a:t>AGG</a:t>
+            </a:r>
+          </a:p>
+          <a:p>
+            <a:pPr marL="0" indent="0">
+              <a:buNone/>
+            </a:pPr>
+            <a:r>
+              <a:rPr lang="en-US" b="1" dirty="0"/>
+              <a:t>	</a:t>
+            </a:r>
+            <a:r>
+              <a:rPr lang="en-US" b="1" dirty="0" smtClean="0"/>
+              <a:t>b</a:t>
+            </a:r>
+            <a:r>
+              <a:rPr lang="en-US" b="1" dirty="0"/>
+              <a:t>. </a:t>
+            </a:r>
+            <a:r>
+              <a:rPr lang="en-US" dirty="0" smtClean="0"/>
+              <a:t>CONCAT </a:t>
+            </a:r>
+            <a:endParaRPr lang="en-US" dirty="0"/>
+          </a:p>
+          <a:p>
+            <a:pPr marL="457200" lvl="1" indent="0">
+              <a:buNone/>
+            </a:pPr>
+            <a:r>
+              <a:rPr lang="en-US" b="1" dirty="0"/>
+              <a:t>c. </a:t>
+            </a:r>
+            <a:r>
+              <a:rPr lang="en-US" dirty="0" smtClean="0"/>
+              <a:t>STRING_AGG</a:t>
+            </a:r>
+            <a:endParaRPr lang="en-US" dirty="0"/>
+          </a:p>
+          <a:p>
+            <a:pPr marL="457200" lvl="1" indent="0">
+              <a:buNone/>
+            </a:pPr>
+            <a:r>
+              <a:rPr lang="en-US" b="1" dirty="0"/>
+              <a:t>d. </a:t>
+            </a:r>
+            <a:r>
+              <a:rPr lang="en-US" dirty="0" smtClean="0"/>
+              <a:t>MERGE</a:t>
+            </a:r>
+            <a:endParaRPr lang="en-US" dirty="0"/>
+          </a:p>
+          <a:p>
+            <a:endParaRPr lang="en-US" dirty="0"/>
+          </a:p>
+        </p:txBody>
+      </p:sp>
+    </p:spTree>
+    <p:extLst>
+      <p:ext uri="{BB962C8B-B14F-4D97-AF65-F5344CB8AC3E}">
+        <p14:creationId xmlns:p14="http://schemas.microsoft.com/office/powerpoint/2010/main" val="36163417"/>
+      </p:ext>
+    </p:extLst>
+  </p:cSld>
+  <p:clrMapOvr>
+    <a:masterClrMapping/>
+  </p:clrMapOvr>
+  <p:timing>
+    <p:tnLst>
+      <p:par>
+        <p:cTn id="1" dur="indefinite" restart="never" nodeType="tmRoot"/>
+      </p:par>
+    </p:tnLst>
+  </p:timing>
+</p:sld>
+</file>
+
 <file path=ppt/slides/slide2.xml><?xml version="1.0" encoding="utf-8"?>
 <p:sld xmlns:a="http://schemas.openxmlformats.org/drawingml/2006/main" xmlns:r="http://schemas.openxmlformats.org/officeDocument/2006/relationships" xmlns:p="http://schemas.openxmlformats.org/presentationml/2006/main">
   <p:cSld>
@@ -9723,7 +9333,7 @@
       </p:grpSpPr>
       <p:sp>
         <p:nvSpPr>
-          <p:cNvPr id="4" name="Title 3"/>
+          <p:cNvPr id="2" name="Title 1"/>
           <p:cNvSpPr>
             <a:spLocks noGrp="1"/>
           </p:cNvSpPr>
@@ -9731,45 +9341,196 @@
             <p:ph type="title"/>
           </p:nvPr>
         </p:nvSpPr>
-        <p:spPr/>
+        <p:spPr>
+          <a:xfrm>
+            <a:off x="677334" y="609600"/>
+            <a:ext cx="8596668" cy="781318"/>
+          </a:xfrm>
+        </p:spPr>
         <p:txBody>
           <a:bodyPr/>
           <a:lstStyle/>
           <a:p>
             <a:r>
+              <a:rPr lang="en-US" dirty="0"/>
+              <a:t>Quiz</a:t>
+            </a:r>
+          </a:p>
+        </p:txBody>
+      </p:sp>
+      <p:sp>
+        <p:nvSpPr>
+          <p:cNvPr id="3" name="Content Placeholder 2"/>
+          <p:cNvSpPr>
+            <a:spLocks noGrp="1"/>
+          </p:cNvSpPr>
+          <p:nvPr>
+            <p:ph idx="1"/>
+          </p:nvPr>
+        </p:nvSpPr>
+        <p:spPr>
+          <a:xfrm>
+            <a:off x="677334" y="1390919"/>
+            <a:ext cx="8596668" cy="5254580"/>
+          </a:xfrm>
+        </p:spPr>
+        <p:txBody>
+          <a:bodyPr>
+            <a:normAutofit/>
+          </a:bodyPr>
+          <a:lstStyle/>
+          <a:p>
+            <a:r>
               <a:rPr lang="en-US" dirty="0" smtClean="0"/>
-              <a:t>Knowledge check</a:t>
-            </a:r>
-            <a:endParaRPr lang="en-US" dirty="0"/>
-          </a:p>
-        </p:txBody>
-      </p:sp>
-      <p:sp>
-        <p:nvSpPr>
-          <p:cNvPr id="2" name="Text Placeholder 1"/>
-          <p:cNvSpPr>
-            <a:spLocks noGrp="1"/>
-          </p:cNvSpPr>
-          <p:nvPr>
-            <p:ph type="body" idx="1"/>
-          </p:nvPr>
-        </p:nvSpPr>
-        <p:spPr/>
-        <p:txBody>
-          <a:bodyPr/>
-          <a:lstStyle/>
-          <a:p>
-            <a:r>
-              <a:rPr lang="en-US" dirty="0"/>
-              <a:t>Quiz, Discussion, Homework</a:t>
-            </a:r>
+              <a:t>Can we group data from multiple records without using GROUP BY function?</a:t>
+            </a:r>
+          </a:p>
+          <a:p>
+            <a:pPr marL="0" indent="0">
+              <a:buNone/>
+            </a:pPr>
+            <a:r>
+              <a:rPr lang="en-US" b="1" dirty="0"/>
+              <a:t> </a:t>
+            </a:r>
+            <a:r>
+              <a:rPr lang="en-US" b="1" dirty="0" smtClean="0"/>
+              <a:t>      a</a:t>
+            </a:r>
+            <a:r>
+              <a:rPr lang="en-US" b="1" dirty="0"/>
+              <a:t>. </a:t>
+            </a:r>
+            <a:r>
+              <a:rPr lang="en-US" dirty="0" smtClean="0"/>
+              <a:t>Yes</a:t>
+            </a:r>
+            <a:endParaRPr lang="en-US" dirty="0"/>
+          </a:p>
+          <a:p>
+            <a:pPr marL="457200" lvl="1" indent="0">
+              <a:buNone/>
+            </a:pPr>
+            <a:r>
+              <a:rPr lang="en-US" b="1" dirty="0"/>
+              <a:t>b. </a:t>
+            </a:r>
+            <a:r>
+              <a:rPr lang="en-US" dirty="0" smtClean="0"/>
+              <a:t>No</a:t>
+            </a:r>
+            <a:endParaRPr lang="en-US" dirty="0"/>
+          </a:p>
+          <a:p>
+            <a:r>
+              <a:rPr lang="en-US" dirty="0" smtClean="0"/>
+              <a:t>Which operator is used to filter the resultset by the result of aggregate function?</a:t>
+            </a:r>
+            <a:endParaRPr lang="en-US" dirty="0"/>
+          </a:p>
+          <a:p>
+            <a:pPr marL="457200" lvl="1" indent="0">
+              <a:buNone/>
+            </a:pPr>
+            <a:r>
+              <a:rPr lang="en-US" b="1" dirty="0" smtClean="0"/>
+              <a:t>a. </a:t>
+            </a:r>
+            <a:r>
+              <a:rPr lang="en-US" dirty="0" smtClean="0"/>
+              <a:t>FILTER</a:t>
+            </a:r>
+          </a:p>
+          <a:p>
+            <a:pPr marL="457200" lvl="1" indent="0">
+              <a:buNone/>
+            </a:pPr>
+            <a:r>
+              <a:rPr lang="en-US" b="1" dirty="0" smtClean="0"/>
+              <a:t>b</a:t>
+            </a:r>
+            <a:r>
+              <a:rPr lang="en-US" b="1" dirty="0"/>
+              <a:t>. </a:t>
+            </a:r>
+            <a:r>
+              <a:rPr lang="en-US" dirty="0" smtClean="0"/>
+              <a:t>CHECK</a:t>
+            </a:r>
+            <a:endParaRPr lang="en-US" dirty="0"/>
+          </a:p>
+          <a:p>
+            <a:pPr marL="457200" lvl="1" indent="0">
+              <a:buNone/>
+            </a:pPr>
+            <a:r>
+              <a:rPr lang="en-US" b="1" dirty="0"/>
+              <a:t>c. </a:t>
+            </a:r>
+            <a:r>
+              <a:rPr lang="en-US" dirty="0" smtClean="0"/>
+              <a:t>WHERE</a:t>
+            </a:r>
+            <a:endParaRPr lang="en-US" dirty="0"/>
+          </a:p>
+          <a:p>
+            <a:pPr marL="457200" lvl="1" indent="0">
+              <a:buNone/>
+            </a:pPr>
+            <a:r>
+              <a:rPr lang="en-US" b="1" dirty="0"/>
+              <a:t>d. </a:t>
+            </a:r>
+            <a:r>
+              <a:rPr lang="en-US" dirty="0" smtClean="0"/>
+              <a:t>HAVING</a:t>
+            </a:r>
+            <a:endParaRPr lang="en-US" dirty="0"/>
+          </a:p>
+          <a:p>
+            <a:r>
+              <a:rPr lang="en-US" dirty="0" smtClean="0"/>
+              <a:t>Can we have ORDER BY and HAVING operator in the same statement?</a:t>
+            </a:r>
+          </a:p>
+          <a:p>
+            <a:pPr marL="457200" lvl="1" indent="0">
+              <a:buNone/>
+            </a:pPr>
+            <a:r>
+              <a:rPr lang="en-US" b="1" dirty="0" smtClean="0"/>
+              <a:t>a</a:t>
+            </a:r>
+            <a:r>
+              <a:rPr lang="en-US" b="1" dirty="0"/>
+              <a:t>. </a:t>
+            </a:r>
+            <a:r>
+              <a:rPr lang="en-US" dirty="0" smtClean="0"/>
+              <a:t>Yes</a:t>
+            </a:r>
+            <a:endParaRPr lang="en-US" dirty="0"/>
+          </a:p>
+          <a:p>
+            <a:pPr marL="457200" lvl="1" indent="0">
+              <a:buNone/>
+            </a:pPr>
+            <a:r>
+              <a:rPr lang="en-US" b="1" dirty="0"/>
+              <a:t>b. </a:t>
+            </a:r>
+            <a:r>
+              <a:rPr lang="en-US" dirty="0" smtClean="0"/>
+              <a:t>No</a:t>
+            </a:r>
+            <a:endParaRPr lang="en-US" dirty="0"/>
           </a:p>
         </p:txBody>
       </p:sp>
     </p:spTree>
     <p:extLst>
       <p:ext uri="{BB962C8B-B14F-4D97-AF65-F5344CB8AC3E}">
-        <p14:creationId xmlns:p14="http://schemas.microsoft.com/office/powerpoint/2010/main" val="2257886123"/>
+        <p14:creationId xmlns:p14="http://schemas.microsoft.com/office/powerpoint/2010/main" val="761919073"/>
       </p:ext>
     </p:extLst>
   </p:cSld>
@@ -9815,564 +9576,6 @@
         </p:nvSpPr>
         <p:spPr>
           <a:xfrm>
-            <a:off x="677334" y="609600"/>
-            <a:ext cx="8596668" cy="768439"/>
-          </a:xfrm>
-        </p:spPr>
-        <p:txBody>
-          <a:bodyPr/>
-          <a:lstStyle/>
-          <a:p>
-            <a:r>
-              <a:rPr lang="en-US" dirty="0" smtClean="0"/>
-              <a:t>Quiz</a:t>
-            </a:r>
-            <a:endParaRPr lang="en-US" dirty="0"/>
-          </a:p>
-        </p:txBody>
-      </p:sp>
-      <p:sp>
-        <p:nvSpPr>
-          <p:cNvPr id="3" name="Content Placeholder 2"/>
-          <p:cNvSpPr>
-            <a:spLocks noGrp="1"/>
-          </p:cNvSpPr>
-          <p:nvPr>
-            <p:ph idx="1"/>
-          </p:nvPr>
-        </p:nvSpPr>
-        <p:spPr>
-          <a:xfrm>
-            <a:off x="677334" y="1378039"/>
-            <a:ext cx="8596668" cy="5203065"/>
-          </a:xfrm>
-        </p:spPr>
-        <p:txBody>
-          <a:bodyPr>
-            <a:normAutofit fontScale="85000" lnSpcReduction="10000"/>
-          </a:bodyPr>
-          <a:lstStyle/>
-          <a:p>
-            <a:r>
-              <a:rPr lang="en-US" dirty="0" smtClean="0"/>
-              <a:t>Can we assign multiple values to scalar variable?</a:t>
-            </a:r>
-            <a:endParaRPr lang="en-US" dirty="0"/>
-          </a:p>
-          <a:p>
-            <a:pPr marL="457200" lvl="1" indent="0">
-              <a:buNone/>
-            </a:pPr>
-            <a:r>
-              <a:rPr lang="en-US" b="1" dirty="0" smtClean="0"/>
-              <a:t>a.</a:t>
-            </a:r>
-            <a:r>
-              <a:rPr lang="en-US" dirty="0"/>
-              <a:t> </a:t>
-            </a:r>
-            <a:r>
-              <a:rPr lang="en-US" dirty="0" smtClean="0"/>
-              <a:t>Yes</a:t>
-            </a:r>
-            <a:endParaRPr lang="en-US" dirty="0"/>
-          </a:p>
-          <a:p>
-            <a:pPr marL="457200" lvl="1" indent="0">
-              <a:buNone/>
-            </a:pPr>
-            <a:r>
-              <a:rPr lang="en-US" b="1" dirty="0" smtClean="0"/>
-              <a:t>b. </a:t>
-            </a:r>
-            <a:r>
-              <a:rPr lang="en-US" dirty="0" smtClean="0"/>
-              <a:t>No</a:t>
-            </a:r>
-          </a:p>
-          <a:p>
-            <a:r>
-              <a:rPr lang="en-US" dirty="0"/>
-              <a:t>Can we </a:t>
-            </a:r>
-            <a:r>
-              <a:rPr lang="en-US" dirty="0" smtClean="0"/>
-              <a:t>have WHERE operator in the same statement with GROUP BY operator?</a:t>
-            </a:r>
-          </a:p>
-          <a:p>
-            <a:pPr marL="0" indent="0">
-              <a:buNone/>
-            </a:pPr>
-            <a:r>
-              <a:rPr lang="en-US" dirty="0"/>
-              <a:t>	</a:t>
-            </a:r>
-            <a:r>
-              <a:rPr lang="en-US" b="1" dirty="0" smtClean="0"/>
-              <a:t>a</a:t>
-            </a:r>
-            <a:r>
-              <a:rPr lang="en-US" b="1" dirty="0"/>
-              <a:t>.</a:t>
-            </a:r>
-            <a:r>
-              <a:rPr lang="en-US" dirty="0"/>
-              <a:t> Yes</a:t>
-            </a:r>
-          </a:p>
-          <a:p>
-            <a:pPr marL="457200" lvl="1" indent="0">
-              <a:buNone/>
-            </a:pPr>
-            <a:r>
-              <a:rPr lang="en-US" b="1" dirty="0"/>
-              <a:t>b. </a:t>
-            </a:r>
-            <a:r>
-              <a:rPr lang="en-US" dirty="0"/>
-              <a:t>No</a:t>
-            </a:r>
-          </a:p>
-          <a:p>
-            <a:r>
-              <a:rPr lang="en-US" dirty="0" smtClean="0"/>
-              <a:t>Which SQL function is used to determine number of characters in the string?</a:t>
-            </a:r>
-          </a:p>
-          <a:p>
-            <a:pPr marL="457200" lvl="1" indent="0">
-              <a:buNone/>
-            </a:pPr>
-            <a:r>
-              <a:rPr lang="en-US" b="1" dirty="0" smtClean="0"/>
-              <a:t>a</a:t>
-            </a:r>
-            <a:r>
-              <a:rPr lang="en-US" b="1" dirty="0"/>
-              <a:t>. </a:t>
-            </a:r>
-            <a:r>
-              <a:rPr lang="en-US" dirty="0" smtClean="0"/>
-              <a:t>LEFT</a:t>
-            </a:r>
-            <a:endParaRPr lang="en-US" dirty="0"/>
-          </a:p>
-          <a:p>
-            <a:pPr marL="457200" lvl="1" indent="0">
-              <a:buNone/>
-            </a:pPr>
-            <a:r>
-              <a:rPr lang="en-US" b="1" dirty="0"/>
-              <a:t>b. </a:t>
-            </a:r>
-            <a:r>
-              <a:rPr lang="en-US" dirty="0" smtClean="0"/>
-              <a:t>STRING</a:t>
-            </a:r>
-          </a:p>
-          <a:p>
-            <a:pPr marL="457200" lvl="1" indent="0">
-              <a:buNone/>
-            </a:pPr>
-            <a:r>
-              <a:rPr lang="en-US" b="1" dirty="0" smtClean="0"/>
-              <a:t>c. </a:t>
-            </a:r>
-            <a:r>
-              <a:rPr lang="en-US" dirty="0" smtClean="0"/>
-              <a:t>STRING_SIZE</a:t>
-            </a:r>
-          </a:p>
-          <a:p>
-            <a:pPr marL="457200" lvl="1" indent="0">
-              <a:buNone/>
-            </a:pPr>
-            <a:r>
-              <a:rPr lang="en-US" b="1" dirty="0" smtClean="0"/>
-              <a:t>d</a:t>
-            </a:r>
-            <a:r>
-              <a:rPr lang="en-US" b="1" dirty="0"/>
-              <a:t>. </a:t>
-            </a:r>
-            <a:r>
-              <a:rPr lang="en-US" dirty="0" smtClean="0"/>
-              <a:t>LEN</a:t>
-            </a:r>
-          </a:p>
-          <a:p>
-            <a:r>
-              <a:rPr lang="en-US" dirty="0" smtClean="0"/>
-              <a:t>Which SQL function is used to concatenate multiple string records into single value?</a:t>
-            </a:r>
-          </a:p>
-          <a:p>
-            <a:pPr marL="0" indent="0">
-              <a:buNone/>
-            </a:pPr>
-            <a:r>
-              <a:rPr lang="en-US" dirty="0"/>
-              <a:t> </a:t>
-            </a:r>
-            <a:r>
-              <a:rPr lang="en-US" dirty="0" smtClean="0"/>
-              <a:t>      </a:t>
-            </a:r>
-            <a:r>
-              <a:rPr lang="en-US" b="1" dirty="0" smtClean="0"/>
-              <a:t>a</a:t>
-            </a:r>
-            <a:r>
-              <a:rPr lang="en-US" b="1" dirty="0"/>
-              <a:t>.</a:t>
-            </a:r>
-            <a:r>
-              <a:rPr lang="en-US" dirty="0"/>
-              <a:t> </a:t>
-            </a:r>
-            <a:r>
-              <a:rPr lang="en-US" dirty="0" smtClean="0"/>
-              <a:t>AGG</a:t>
-            </a:r>
-          </a:p>
-          <a:p>
-            <a:pPr marL="0" indent="0">
-              <a:buNone/>
-            </a:pPr>
-            <a:r>
-              <a:rPr lang="en-US" b="1" dirty="0"/>
-              <a:t>	</a:t>
-            </a:r>
-            <a:r>
-              <a:rPr lang="en-US" b="1" dirty="0" smtClean="0"/>
-              <a:t>b</a:t>
-            </a:r>
-            <a:r>
-              <a:rPr lang="en-US" b="1" dirty="0"/>
-              <a:t>. </a:t>
-            </a:r>
-            <a:r>
-              <a:rPr lang="en-US" dirty="0" smtClean="0"/>
-              <a:t>CONCAT </a:t>
-            </a:r>
-            <a:endParaRPr lang="en-US" dirty="0"/>
-          </a:p>
-          <a:p>
-            <a:pPr marL="457200" lvl="1" indent="0">
-              <a:buNone/>
-            </a:pPr>
-            <a:r>
-              <a:rPr lang="en-US" b="1" dirty="0"/>
-              <a:t>c. </a:t>
-            </a:r>
-            <a:r>
-              <a:rPr lang="en-US" dirty="0" smtClean="0"/>
-              <a:t>STRING_AGG</a:t>
-            </a:r>
-            <a:endParaRPr lang="en-US" dirty="0"/>
-          </a:p>
-          <a:p>
-            <a:pPr marL="457200" lvl="1" indent="0">
-              <a:buNone/>
-            </a:pPr>
-            <a:r>
-              <a:rPr lang="en-US" b="1" dirty="0"/>
-              <a:t>d. </a:t>
-            </a:r>
-            <a:r>
-              <a:rPr lang="en-US" dirty="0" smtClean="0"/>
-              <a:t>MERGE</a:t>
-            </a:r>
-            <a:endParaRPr lang="en-US" dirty="0"/>
-          </a:p>
-          <a:p>
-            <a:endParaRPr lang="en-US" dirty="0"/>
-          </a:p>
-        </p:txBody>
-      </p:sp>
-    </p:spTree>
-    <p:extLst>
-      <p:ext uri="{BB962C8B-B14F-4D97-AF65-F5344CB8AC3E}">
-        <p14:creationId xmlns:p14="http://schemas.microsoft.com/office/powerpoint/2010/main" val="36163417"/>
-      </p:ext>
-    </p:extLst>
-  </p:cSld>
-  <p:clrMapOvr>
-    <a:masterClrMapping/>
-  </p:clrMapOvr>
-  <p:timing>
-    <p:tnLst>
-      <p:par>
-        <p:cTn id="1" dur="indefinite" restart="never" nodeType="tmRoot"/>
-      </p:par>
-    </p:tnLst>
-  </p:timing>
-</p:sld>
-</file>
-
-<file path=ppt/slides/slide22.xml><?xml version="1.0" encoding="utf-8"?>
-<p:sld xmlns:a="http://schemas.openxmlformats.org/drawingml/2006/main" xmlns:r="http://schemas.openxmlformats.org/officeDocument/2006/relationships" xmlns:p="http://schemas.openxmlformats.org/presentationml/2006/main">
-  <p:cSld>
-    <p:spTree>
-      <p:nvGrpSpPr>
-        <p:cNvPr id="1" name=""/>
-        <p:cNvGrpSpPr/>
-        <p:nvPr/>
-      </p:nvGrpSpPr>
-      <p:grpSpPr>
-        <a:xfrm>
-          <a:off x="0" y="0"/>
-          <a:ext cx="0" cy="0"/>
-          <a:chOff x="0" y="0"/>
-          <a:chExt cx="0" cy="0"/>
-        </a:xfrm>
-      </p:grpSpPr>
-      <p:sp>
-        <p:nvSpPr>
-          <p:cNvPr id="2" name="Title 1"/>
-          <p:cNvSpPr>
-            <a:spLocks noGrp="1"/>
-          </p:cNvSpPr>
-          <p:nvPr>
-            <p:ph type="title"/>
-          </p:nvPr>
-        </p:nvSpPr>
-        <p:spPr>
-          <a:xfrm>
-            <a:off x="677334" y="609600"/>
-            <a:ext cx="8596668" cy="781318"/>
-          </a:xfrm>
-        </p:spPr>
-        <p:txBody>
-          <a:bodyPr/>
-          <a:lstStyle/>
-          <a:p>
-            <a:r>
-              <a:rPr lang="en-US" dirty="0"/>
-              <a:t>Quiz</a:t>
-            </a:r>
-          </a:p>
-        </p:txBody>
-      </p:sp>
-      <p:sp>
-        <p:nvSpPr>
-          <p:cNvPr id="3" name="Content Placeholder 2"/>
-          <p:cNvSpPr>
-            <a:spLocks noGrp="1"/>
-          </p:cNvSpPr>
-          <p:nvPr>
-            <p:ph idx="1"/>
-          </p:nvPr>
-        </p:nvSpPr>
-        <p:spPr>
-          <a:xfrm>
-            <a:off x="677334" y="1390919"/>
-            <a:ext cx="8596668" cy="5254580"/>
-          </a:xfrm>
-        </p:spPr>
-        <p:txBody>
-          <a:bodyPr>
-            <a:normAutofit/>
-          </a:bodyPr>
-          <a:lstStyle/>
-          <a:p>
-            <a:r>
-              <a:rPr lang="en-US" dirty="0" smtClean="0"/>
-              <a:t>Can we group data from multiple records without using GROUP BY function?</a:t>
-            </a:r>
-          </a:p>
-          <a:p>
-            <a:pPr marL="0" indent="0">
-              <a:buNone/>
-            </a:pPr>
-            <a:r>
-              <a:rPr lang="en-US" b="1" dirty="0"/>
-              <a:t> </a:t>
-            </a:r>
-            <a:r>
-              <a:rPr lang="en-US" b="1" dirty="0" smtClean="0"/>
-              <a:t>      a</a:t>
-            </a:r>
-            <a:r>
-              <a:rPr lang="en-US" b="1" dirty="0"/>
-              <a:t>. </a:t>
-            </a:r>
-            <a:r>
-              <a:rPr lang="en-US" dirty="0" smtClean="0"/>
-              <a:t>Yes</a:t>
-            </a:r>
-            <a:endParaRPr lang="en-US" dirty="0"/>
-          </a:p>
-          <a:p>
-            <a:pPr marL="457200" lvl="1" indent="0">
-              <a:buNone/>
-            </a:pPr>
-            <a:r>
-              <a:rPr lang="en-US" b="1" dirty="0"/>
-              <a:t>b. </a:t>
-            </a:r>
-            <a:r>
-              <a:rPr lang="en-US" dirty="0" smtClean="0"/>
-              <a:t>No</a:t>
-            </a:r>
-            <a:endParaRPr lang="en-US" dirty="0"/>
-          </a:p>
-          <a:p>
-            <a:r>
-              <a:rPr lang="en-US" dirty="0" smtClean="0"/>
-              <a:t>Which operator is used to filter the resultset by the result of aggregate function?</a:t>
-            </a:r>
-            <a:endParaRPr lang="en-US" dirty="0"/>
-          </a:p>
-          <a:p>
-            <a:pPr marL="457200" lvl="1" indent="0">
-              <a:buNone/>
-            </a:pPr>
-            <a:r>
-              <a:rPr lang="en-US" b="1" dirty="0" smtClean="0"/>
-              <a:t>a. </a:t>
-            </a:r>
-            <a:r>
-              <a:rPr lang="en-US" dirty="0" smtClean="0"/>
-              <a:t>FILTER</a:t>
-            </a:r>
-          </a:p>
-          <a:p>
-            <a:pPr marL="457200" lvl="1" indent="0">
-              <a:buNone/>
-            </a:pPr>
-            <a:r>
-              <a:rPr lang="en-US" b="1" dirty="0" smtClean="0"/>
-              <a:t>b</a:t>
-            </a:r>
-            <a:r>
-              <a:rPr lang="en-US" b="1" dirty="0"/>
-              <a:t>. </a:t>
-            </a:r>
-            <a:r>
-              <a:rPr lang="en-US" dirty="0" smtClean="0"/>
-              <a:t>CHECK</a:t>
-            </a:r>
-            <a:endParaRPr lang="en-US" dirty="0"/>
-          </a:p>
-          <a:p>
-            <a:pPr marL="457200" lvl="1" indent="0">
-              <a:buNone/>
-            </a:pPr>
-            <a:r>
-              <a:rPr lang="en-US" b="1" dirty="0"/>
-              <a:t>c. </a:t>
-            </a:r>
-            <a:r>
-              <a:rPr lang="en-US" dirty="0" smtClean="0"/>
-              <a:t>WHERE</a:t>
-            </a:r>
-            <a:endParaRPr lang="en-US" dirty="0"/>
-          </a:p>
-          <a:p>
-            <a:pPr marL="457200" lvl="1" indent="0">
-              <a:buNone/>
-            </a:pPr>
-            <a:r>
-              <a:rPr lang="en-US" b="1" dirty="0"/>
-              <a:t>d. </a:t>
-            </a:r>
-            <a:r>
-              <a:rPr lang="en-US" dirty="0" smtClean="0"/>
-              <a:t>HAVING</a:t>
-            </a:r>
-            <a:endParaRPr lang="en-US" dirty="0"/>
-          </a:p>
-          <a:p>
-            <a:r>
-              <a:rPr lang="en-US" dirty="0" smtClean="0"/>
-              <a:t>Can we have ORDER BY and HAVING operator in the same statement?</a:t>
-            </a:r>
-          </a:p>
-          <a:p>
-            <a:pPr marL="457200" lvl="1" indent="0">
-              <a:buNone/>
-            </a:pPr>
-            <a:r>
-              <a:rPr lang="en-US" b="1" dirty="0" smtClean="0"/>
-              <a:t>a</a:t>
-            </a:r>
-            <a:r>
-              <a:rPr lang="en-US" b="1" dirty="0"/>
-              <a:t>. </a:t>
-            </a:r>
-            <a:r>
-              <a:rPr lang="en-US" dirty="0" smtClean="0"/>
-              <a:t>Yes</a:t>
-            </a:r>
-            <a:endParaRPr lang="en-US" dirty="0"/>
-          </a:p>
-          <a:p>
-            <a:pPr marL="457200" lvl="1" indent="0">
-              <a:buNone/>
-            </a:pPr>
-            <a:r>
-              <a:rPr lang="en-US" b="1" dirty="0"/>
-              <a:t>b. </a:t>
-            </a:r>
-            <a:r>
-              <a:rPr lang="en-US" dirty="0" smtClean="0"/>
-              <a:t>No</a:t>
-            </a:r>
-            <a:endParaRPr lang="en-US" dirty="0"/>
-          </a:p>
-        </p:txBody>
-      </p:sp>
-    </p:spTree>
-    <p:extLst>
-      <p:ext uri="{BB962C8B-B14F-4D97-AF65-F5344CB8AC3E}">
-        <p14:creationId xmlns:p14="http://schemas.microsoft.com/office/powerpoint/2010/main" val="761919073"/>
-      </p:ext>
-    </p:extLst>
-  </p:cSld>
-  <p:clrMapOvr>
-    <a:masterClrMapping/>
-  </p:clrMapOvr>
-  <p:timing>
-    <p:tnLst>
-      <p:par>
-        <p:cTn id="1" dur="indefinite" restart="never" nodeType="tmRoot"/>
-      </p:par>
-    </p:tnLst>
-  </p:timing>
-</p:sld>
-</file>
-
-<file path=ppt/slides/slide23.xml><?xml version="1.0" encoding="utf-8"?>
-<p:sld xmlns:a="http://schemas.openxmlformats.org/drawingml/2006/main" xmlns:r="http://schemas.openxmlformats.org/officeDocument/2006/relationships" xmlns:p="http://schemas.openxmlformats.org/presentationml/2006/main">
-  <p:cSld>
-    <p:spTree>
-      <p:nvGrpSpPr>
-        <p:cNvPr id="1" name=""/>
-        <p:cNvGrpSpPr/>
-        <p:nvPr/>
-      </p:nvGrpSpPr>
-      <p:grpSpPr>
-        <a:xfrm>
-          <a:off x="0" y="0"/>
-          <a:ext cx="0" cy="0"/>
-          <a:chOff x="0" y="0"/>
-          <a:chExt cx="0" cy="0"/>
-        </a:xfrm>
-      </p:grpSpPr>
-      <p:sp>
-        <p:nvSpPr>
-          <p:cNvPr id="2" name="Title 1"/>
-          <p:cNvSpPr>
-            <a:spLocks noGrp="1"/>
-          </p:cNvSpPr>
-          <p:nvPr>
-            <p:ph type="title"/>
-          </p:nvPr>
-        </p:nvSpPr>
-        <p:spPr>
-          <a:xfrm>
             <a:off x="677334" y="609599"/>
             <a:ext cx="8596668" cy="678288"/>
           </a:xfrm>
@@ -10445,641 +9648,6 @@
       </p:par>
     </p:tnLst>
   </p:timing>
-</p:sld>
-</file>
-
-<file path=ppt/slides/slide24.xml><?xml version="1.0" encoding="utf-8"?>
-<p:sld xmlns:a="http://schemas.openxmlformats.org/drawingml/2006/main" xmlns:r="http://schemas.openxmlformats.org/officeDocument/2006/relationships" xmlns:p="http://schemas.openxmlformats.org/presentationml/2006/main">
-  <p:cSld>
-    <p:spTree>
-      <p:nvGrpSpPr>
-        <p:cNvPr id="1" name=""/>
-        <p:cNvGrpSpPr/>
-        <p:nvPr/>
-      </p:nvGrpSpPr>
-      <p:grpSpPr>
-        <a:xfrm>
-          <a:off x="0" y="0"/>
-          <a:ext cx="0" cy="0"/>
-          <a:chOff x="0" y="0"/>
-          <a:chExt cx="0" cy="0"/>
-        </a:xfrm>
-      </p:grpSpPr>
-      <p:sp>
-        <p:nvSpPr>
-          <p:cNvPr id="4" name="Title 3"/>
-          <p:cNvSpPr>
-            <a:spLocks noGrp="1"/>
-          </p:cNvSpPr>
-          <p:nvPr>
-            <p:ph type="title"/>
-          </p:nvPr>
-        </p:nvSpPr>
-        <p:spPr/>
-        <p:txBody>
-          <a:bodyPr>
-            <a:normAutofit fontScale="90000"/>
-          </a:bodyPr>
-          <a:lstStyle/>
-          <a:p>
-            <a:r>
-              <a:rPr lang="en-US" dirty="0"/>
-              <a:t/>
-            </a:r>
-            <a:br>
-              <a:rPr lang="en-US" dirty="0"/>
-            </a:br>
-            <a:r>
-              <a:rPr lang="en-US" dirty="0"/>
-              <a:t>Homework</a:t>
-            </a:r>
-            <a:br>
-              <a:rPr lang="en-US" dirty="0"/>
-            </a:br>
-            <a:endParaRPr lang="en-US" dirty="0"/>
-          </a:p>
-        </p:txBody>
-      </p:sp>
-    </p:spTree>
-    <p:extLst>
-      <p:ext uri="{BB962C8B-B14F-4D97-AF65-F5344CB8AC3E}">
-        <p14:creationId xmlns:p14="http://schemas.microsoft.com/office/powerpoint/2010/main" val="3948046820"/>
-      </p:ext>
-    </p:extLst>
-  </p:cSld>
-  <p:clrMapOvr>
-    <a:masterClrMapping/>
-  </p:clrMapOvr>
-</p:sld>
-</file>
-
-<file path=ppt/slides/slide25.xml><?xml version="1.0" encoding="utf-8"?>
-<p:sld xmlns:a="http://schemas.openxmlformats.org/drawingml/2006/main" xmlns:r="http://schemas.openxmlformats.org/officeDocument/2006/relationships" xmlns:p="http://schemas.openxmlformats.org/presentationml/2006/main">
-  <p:cSld>
-    <p:spTree>
-      <p:nvGrpSpPr>
-        <p:cNvPr id="1" name=""/>
-        <p:cNvGrpSpPr/>
-        <p:nvPr/>
-      </p:nvGrpSpPr>
-      <p:grpSpPr>
-        <a:xfrm>
-          <a:off x="0" y="0"/>
-          <a:ext cx="0" cy="0"/>
-          <a:chOff x="0" y="0"/>
-          <a:chExt cx="0" cy="0"/>
-        </a:xfrm>
-      </p:grpSpPr>
-      <p:sp>
-        <p:nvSpPr>
-          <p:cNvPr id="4" name="Title 3"/>
-          <p:cNvSpPr>
-            <a:spLocks noGrp="1"/>
-          </p:cNvSpPr>
-          <p:nvPr>
-            <p:ph type="title"/>
-          </p:nvPr>
-        </p:nvSpPr>
-        <p:spPr/>
-        <p:txBody>
-          <a:bodyPr/>
-          <a:lstStyle/>
-          <a:p>
-            <a:r>
-              <a:rPr lang="en-US" dirty="0"/>
-              <a:t>Homework requirement</a:t>
-            </a:r>
-            <a:r>
-              <a:rPr lang="mk-MK" dirty="0"/>
-              <a:t> 1/4</a:t>
-            </a:r>
-            <a:endParaRPr lang="en-US" dirty="0"/>
-          </a:p>
-        </p:txBody>
-      </p:sp>
-      <p:sp>
-        <p:nvSpPr>
-          <p:cNvPr id="5" name="Content Placeholder 4"/>
-          <p:cNvSpPr>
-            <a:spLocks noGrp="1"/>
-          </p:cNvSpPr>
-          <p:nvPr>
-            <p:ph idx="1"/>
-          </p:nvPr>
-        </p:nvSpPr>
-        <p:spPr>
-          <a:xfrm>
-            <a:off x="677333" y="2160589"/>
-            <a:ext cx="9424610" cy="4505387"/>
-          </a:xfrm>
-        </p:spPr>
-        <p:txBody>
-          <a:bodyPr>
-            <a:normAutofit fontScale="92500" lnSpcReduction="10000"/>
-          </a:bodyPr>
-          <a:lstStyle/>
-          <a:p>
-            <a:r>
-              <a:rPr lang="en-US" dirty="0"/>
-              <a:t>Declare scalar variable for storing FirstName values</a:t>
-            </a:r>
-          </a:p>
-          <a:p>
-            <a:r>
-              <a:rPr lang="en-US" dirty="0"/>
-              <a:t>	Assign value 'Antonio' to the FirstName variable</a:t>
-            </a:r>
-          </a:p>
-          <a:p>
-            <a:r>
-              <a:rPr lang="en-US" dirty="0"/>
-              <a:t>	Find all Students having FirstName same as the variable</a:t>
-            </a:r>
-          </a:p>
-          <a:p>
-            <a:endParaRPr lang="en-US" dirty="0"/>
-          </a:p>
-          <a:p>
-            <a:r>
-              <a:rPr lang="en-US" dirty="0"/>
-              <a:t>Declare table variable @</a:t>
-            </a:r>
-            <a:r>
-              <a:rPr lang="en-US" dirty="0" err="1"/>
-              <a:t>StudentList</a:t>
-            </a:r>
-            <a:r>
-              <a:rPr lang="en-US" dirty="0"/>
-              <a:t> that will contain </a:t>
-            </a:r>
-            <a:r>
-              <a:rPr lang="en-US" dirty="0" err="1"/>
-              <a:t>StudentId</a:t>
-            </a:r>
-            <a:r>
-              <a:rPr lang="en-US" dirty="0"/>
-              <a:t>, FirstName and </a:t>
-            </a:r>
-            <a:r>
-              <a:rPr lang="en-US" dirty="0" err="1"/>
-              <a:t>DateOfBirth</a:t>
-            </a:r>
-            <a:endParaRPr lang="en-US" dirty="0"/>
-          </a:p>
-          <a:p>
-            <a:r>
-              <a:rPr lang="en-US" dirty="0"/>
-              <a:t>	Fill the table variable with all Female students</a:t>
-            </a:r>
-          </a:p>
-          <a:p>
-            <a:r>
-              <a:rPr lang="en-US" dirty="0"/>
-              <a:t>	List all Students from table variable</a:t>
-            </a:r>
-          </a:p>
-          <a:p>
-            <a:r>
-              <a:rPr lang="en-US" dirty="0"/>
-              <a:t>	List all Students from table variable younger than 1992-02-22</a:t>
-            </a:r>
-          </a:p>
-          <a:p>
-            <a:endParaRPr lang="en-US" dirty="0"/>
-          </a:p>
-          <a:p>
-            <a:r>
-              <a:rPr lang="en-US" dirty="0"/>
-              <a:t>Declare temp table #</a:t>
-            </a:r>
-            <a:r>
-              <a:rPr lang="en-US" dirty="0" err="1"/>
-              <a:t>StudentList</a:t>
-            </a:r>
-            <a:r>
-              <a:rPr lang="mk-MK" dirty="0"/>
-              <a:t> </a:t>
-            </a:r>
-            <a:r>
-              <a:rPr lang="en-US" dirty="0"/>
-              <a:t>that will contain </a:t>
-            </a:r>
-            <a:r>
-              <a:rPr lang="en-US" dirty="0" err="1"/>
-              <a:t>LastName</a:t>
-            </a:r>
-            <a:r>
-              <a:rPr lang="en-US" dirty="0"/>
-              <a:t> and </a:t>
-            </a:r>
-            <a:r>
-              <a:rPr lang="en-US" dirty="0" err="1"/>
-              <a:t>EnrolledDate</a:t>
-            </a:r>
-            <a:r>
-              <a:rPr lang="en-US" dirty="0"/>
-              <a:t> columns</a:t>
-            </a:r>
-          </a:p>
-          <a:p>
-            <a:r>
-              <a:rPr lang="en-US" dirty="0"/>
-              <a:t>	Fill the temp table with all Male students having First Name starting with ‘A’</a:t>
-            </a:r>
-          </a:p>
-          <a:p>
-            <a:r>
-              <a:rPr lang="en-US" dirty="0"/>
-              <a:t>	List all Students from temp table who have Last Name with length greater than 5</a:t>
-            </a:r>
-          </a:p>
-        </p:txBody>
-      </p:sp>
-    </p:spTree>
-    <p:extLst>
-      <p:ext uri="{BB962C8B-B14F-4D97-AF65-F5344CB8AC3E}">
-        <p14:creationId xmlns:p14="http://schemas.microsoft.com/office/powerpoint/2010/main" val="157966401"/>
-      </p:ext>
-    </p:extLst>
-  </p:cSld>
-  <p:clrMapOvr>
-    <a:masterClrMapping/>
-  </p:clrMapOvr>
-</p:sld>
-</file>
-
-<file path=ppt/slides/slide26.xml><?xml version="1.0" encoding="utf-8"?>
-<p:sld xmlns:a="http://schemas.openxmlformats.org/drawingml/2006/main" xmlns:r="http://schemas.openxmlformats.org/officeDocument/2006/relationships" xmlns:p="http://schemas.openxmlformats.org/presentationml/2006/main">
-  <p:cSld>
-    <p:spTree>
-      <p:nvGrpSpPr>
-        <p:cNvPr id="1" name=""/>
-        <p:cNvGrpSpPr/>
-        <p:nvPr/>
-      </p:nvGrpSpPr>
-      <p:grpSpPr>
-        <a:xfrm>
-          <a:off x="0" y="0"/>
-          <a:ext cx="0" cy="0"/>
-          <a:chOff x="0" y="0"/>
-          <a:chExt cx="0" cy="0"/>
-        </a:xfrm>
-      </p:grpSpPr>
-      <p:sp>
-        <p:nvSpPr>
-          <p:cNvPr id="2" name="Title 1">
-            <a:extLst>
-              <a:ext uri="{FF2B5EF4-FFF2-40B4-BE49-F238E27FC236}">
-                <a16:creationId xmlns:a16="http://schemas.microsoft.com/office/drawing/2014/main" id="{FE5624F9-B711-4FC6-8E9F-742526A0CCC1}"/>
-              </a:ext>
-            </a:extLst>
-          </p:cNvPr>
-          <p:cNvSpPr>
-            <a:spLocks noGrp="1"/>
-          </p:cNvSpPr>
-          <p:nvPr>
-            <p:ph type="title"/>
-          </p:nvPr>
-        </p:nvSpPr>
-        <p:spPr/>
-        <p:txBody>
-          <a:bodyPr/>
-          <a:lstStyle/>
-          <a:p>
-            <a:r>
-              <a:rPr lang="en-US" dirty="0"/>
-              <a:t>Homework requirement</a:t>
-            </a:r>
-            <a:r>
-              <a:rPr lang="mk-MK" dirty="0"/>
-              <a:t> 2/4</a:t>
-            </a:r>
-          </a:p>
-        </p:txBody>
-      </p:sp>
-      <p:sp>
-        <p:nvSpPr>
-          <p:cNvPr id="3" name="Content Placeholder 2">
-            <a:extLst>
-              <a:ext uri="{FF2B5EF4-FFF2-40B4-BE49-F238E27FC236}">
-                <a16:creationId xmlns:a16="http://schemas.microsoft.com/office/drawing/2014/main" id="{F419AFA7-0A3C-4606-9F32-1D2D20C9BD88}"/>
-              </a:ext>
-            </a:extLst>
-          </p:cNvPr>
-          <p:cNvSpPr>
-            <a:spLocks noGrp="1"/>
-          </p:cNvSpPr>
-          <p:nvPr>
-            <p:ph idx="1"/>
-          </p:nvPr>
-        </p:nvSpPr>
-        <p:spPr/>
-        <p:txBody>
-          <a:bodyPr/>
-          <a:lstStyle/>
-          <a:p>
-            <a:r>
-              <a:rPr lang="en-US" dirty="0"/>
-              <a:t>Calculate the count of all grades in the system</a:t>
-            </a:r>
-          </a:p>
-          <a:p>
-            <a:r>
-              <a:rPr lang="en-US" dirty="0"/>
-              <a:t>Calculate the count of all grades per Teacher in the system</a:t>
-            </a:r>
-          </a:p>
-          <a:p>
-            <a:r>
-              <a:rPr lang="en-US" dirty="0"/>
-              <a:t>Calculate the count of all grades per Teacher in the system for first 100 Students (ID &lt; 100)</a:t>
-            </a:r>
-          </a:p>
-          <a:p>
-            <a:r>
-              <a:rPr lang="en-US" dirty="0"/>
-              <a:t>Find the Maximal Grade, and the Average Grade per Student on all grades in the system</a:t>
-            </a:r>
-            <a:endParaRPr lang="mk-MK" dirty="0"/>
-          </a:p>
-        </p:txBody>
-      </p:sp>
-    </p:spTree>
-    <p:extLst>
-      <p:ext uri="{BB962C8B-B14F-4D97-AF65-F5344CB8AC3E}">
-        <p14:creationId xmlns:p14="http://schemas.microsoft.com/office/powerpoint/2010/main" val="3391648878"/>
-      </p:ext>
-    </p:extLst>
-  </p:cSld>
-  <p:clrMapOvr>
-    <a:masterClrMapping/>
-  </p:clrMapOvr>
-</p:sld>
-</file>
-
-<file path=ppt/slides/slide27.xml><?xml version="1.0" encoding="utf-8"?>
-<p:sld xmlns:a="http://schemas.openxmlformats.org/drawingml/2006/main" xmlns:r="http://schemas.openxmlformats.org/officeDocument/2006/relationships" xmlns:p="http://schemas.openxmlformats.org/presentationml/2006/main">
-  <p:cSld>
-    <p:spTree>
-      <p:nvGrpSpPr>
-        <p:cNvPr id="1" name=""/>
-        <p:cNvGrpSpPr/>
-        <p:nvPr/>
-      </p:nvGrpSpPr>
-      <p:grpSpPr>
-        <a:xfrm>
-          <a:off x="0" y="0"/>
-          <a:ext cx="0" cy="0"/>
-          <a:chOff x="0" y="0"/>
-          <a:chExt cx="0" cy="0"/>
-        </a:xfrm>
-      </p:grpSpPr>
-      <p:sp>
-        <p:nvSpPr>
-          <p:cNvPr id="2" name="Title 1">
-            <a:extLst>
-              <a:ext uri="{FF2B5EF4-FFF2-40B4-BE49-F238E27FC236}">
-                <a16:creationId xmlns:a16="http://schemas.microsoft.com/office/drawing/2014/main" id="{FE5624F9-B711-4FC6-8E9F-742526A0CCC1}"/>
-              </a:ext>
-            </a:extLst>
-          </p:cNvPr>
-          <p:cNvSpPr>
-            <a:spLocks noGrp="1"/>
-          </p:cNvSpPr>
-          <p:nvPr>
-            <p:ph type="title"/>
-          </p:nvPr>
-        </p:nvSpPr>
-        <p:spPr/>
-        <p:txBody>
-          <a:bodyPr/>
-          <a:lstStyle/>
-          <a:p>
-            <a:r>
-              <a:rPr lang="en-US" dirty="0"/>
-              <a:t>Homework requirement</a:t>
-            </a:r>
-            <a:r>
-              <a:rPr lang="mk-MK" dirty="0"/>
-              <a:t> 3/4</a:t>
-            </a:r>
-          </a:p>
-        </p:txBody>
-      </p:sp>
-      <p:sp>
-        <p:nvSpPr>
-          <p:cNvPr id="3" name="Content Placeholder 2">
-            <a:extLst>
-              <a:ext uri="{FF2B5EF4-FFF2-40B4-BE49-F238E27FC236}">
-                <a16:creationId xmlns:a16="http://schemas.microsoft.com/office/drawing/2014/main" id="{F419AFA7-0A3C-4606-9F32-1D2D20C9BD88}"/>
-              </a:ext>
-            </a:extLst>
-          </p:cNvPr>
-          <p:cNvSpPr>
-            <a:spLocks noGrp="1"/>
-          </p:cNvSpPr>
-          <p:nvPr>
-            <p:ph idx="1"/>
-          </p:nvPr>
-        </p:nvSpPr>
-        <p:spPr/>
-        <p:txBody>
-          <a:bodyPr/>
-          <a:lstStyle/>
-          <a:p>
-            <a:r>
-              <a:rPr lang="en-US" dirty="0"/>
-              <a:t>Calculate the count of all grades per Teacher in the system and filter only grade count greater then 200</a:t>
-            </a:r>
-          </a:p>
-          <a:p>
-            <a:r>
-              <a:rPr lang="en-US" dirty="0"/>
-              <a:t>Calculate the count of all grades per Teacher in the system for first 100 Students (ID &lt; 100) and filter teachers with more than 50 Grade count</a:t>
-            </a:r>
-          </a:p>
-          <a:p>
-            <a:r>
-              <a:rPr lang="en-US" dirty="0"/>
-              <a:t>Find the Grade Count, Maximal Grade, and the Average Grade per Student on all grades in the system. Filter only records where Maximal Grade is equal to Average Grade</a:t>
-            </a:r>
-          </a:p>
-          <a:p>
-            <a:r>
-              <a:rPr lang="en-US" dirty="0"/>
-              <a:t>List Student First Name and Last Name next to the other details from previous query</a:t>
-            </a:r>
-            <a:endParaRPr lang="mk-MK" dirty="0"/>
-          </a:p>
-        </p:txBody>
-      </p:sp>
-    </p:spTree>
-    <p:extLst>
-      <p:ext uri="{BB962C8B-B14F-4D97-AF65-F5344CB8AC3E}">
-        <p14:creationId xmlns:p14="http://schemas.microsoft.com/office/powerpoint/2010/main" val="3034517589"/>
-      </p:ext>
-    </p:extLst>
-  </p:cSld>
-  <p:clrMapOvr>
-    <a:masterClrMapping/>
-  </p:clrMapOvr>
-</p:sld>
-</file>
-
-<file path=ppt/slides/slide28.xml><?xml version="1.0" encoding="utf-8"?>
-<p:sld xmlns:a="http://schemas.openxmlformats.org/drawingml/2006/main" xmlns:r="http://schemas.openxmlformats.org/officeDocument/2006/relationships" xmlns:p="http://schemas.openxmlformats.org/presentationml/2006/main">
-  <p:cSld>
-    <p:spTree>
-      <p:nvGrpSpPr>
-        <p:cNvPr id="1" name=""/>
-        <p:cNvGrpSpPr/>
-        <p:nvPr/>
-      </p:nvGrpSpPr>
-      <p:grpSpPr>
-        <a:xfrm>
-          <a:off x="0" y="0"/>
-          <a:ext cx="0" cy="0"/>
-          <a:chOff x="0" y="0"/>
-          <a:chExt cx="0" cy="0"/>
-        </a:xfrm>
-      </p:grpSpPr>
-      <p:sp>
-        <p:nvSpPr>
-          <p:cNvPr id="2" name="Title 1">
-            <a:extLst>
-              <a:ext uri="{FF2B5EF4-FFF2-40B4-BE49-F238E27FC236}">
-                <a16:creationId xmlns:a16="http://schemas.microsoft.com/office/drawing/2014/main" id="{0FF7738A-FD6F-49D4-B79B-FD3113CEF07C}"/>
-              </a:ext>
-            </a:extLst>
-          </p:cNvPr>
-          <p:cNvSpPr>
-            <a:spLocks noGrp="1"/>
-          </p:cNvSpPr>
-          <p:nvPr>
-            <p:ph type="title"/>
-          </p:nvPr>
-        </p:nvSpPr>
-        <p:spPr/>
-        <p:txBody>
-          <a:bodyPr/>
-          <a:lstStyle/>
-          <a:p>
-            <a:r>
-              <a:rPr lang="en-US" dirty="0"/>
-              <a:t>Homework requirement</a:t>
-            </a:r>
-            <a:r>
-              <a:rPr lang="mk-MK" dirty="0"/>
-              <a:t> 4/4</a:t>
-            </a:r>
-          </a:p>
-        </p:txBody>
-      </p:sp>
-      <p:sp>
-        <p:nvSpPr>
-          <p:cNvPr id="3" name="Content Placeholder 2">
-            <a:extLst>
-              <a:ext uri="{FF2B5EF4-FFF2-40B4-BE49-F238E27FC236}">
-                <a16:creationId xmlns:a16="http://schemas.microsoft.com/office/drawing/2014/main" id="{41722F95-08C4-464F-A600-DC9066329272}"/>
-              </a:ext>
-            </a:extLst>
-          </p:cNvPr>
-          <p:cNvSpPr>
-            <a:spLocks noGrp="1"/>
-          </p:cNvSpPr>
-          <p:nvPr>
-            <p:ph idx="1"/>
-          </p:nvPr>
-        </p:nvSpPr>
-        <p:spPr/>
-        <p:txBody>
-          <a:bodyPr/>
-          <a:lstStyle/>
-          <a:p>
-            <a:r>
-              <a:rPr lang="en-US" dirty="0"/>
-              <a:t>Create new view (</a:t>
-            </a:r>
-            <a:r>
-              <a:rPr lang="en-US" dirty="0" err="1"/>
-              <a:t>vv_StudentGrades</a:t>
-            </a:r>
-            <a:r>
-              <a:rPr lang="en-US" dirty="0"/>
-              <a:t>) that will List all </a:t>
-            </a:r>
-            <a:r>
-              <a:rPr lang="en-US" dirty="0" err="1"/>
-              <a:t>StudentIds</a:t>
-            </a:r>
-            <a:r>
-              <a:rPr lang="en-US" dirty="0"/>
-              <a:t> and count of Grades per student</a:t>
-            </a:r>
-          </a:p>
-          <a:p>
-            <a:r>
-              <a:rPr lang="en-US" dirty="0"/>
-              <a:t>Change the view to show Student First and Last Names instead of </a:t>
-            </a:r>
-            <a:r>
-              <a:rPr lang="en-US" dirty="0" err="1"/>
-              <a:t>StudentID</a:t>
-            </a:r>
-            <a:endParaRPr lang="en-US" dirty="0"/>
-          </a:p>
-          <a:p>
-            <a:r>
-              <a:rPr lang="en-US" dirty="0"/>
-              <a:t>List all rows from view ordered by biggest Grade Count</a:t>
-            </a:r>
-          </a:p>
-          <a:p>
-            <a:endParaRPr lang="en-US" dirty="0"/>
-          </a:p>
-          <a:p>
-            <a:r>
-              <a:rPr lang="en-US" dirty="0"/>
-              <a:t>Create new view (</a:t>
-            </a:r>
-            <a:r>
-              <a:rPr lang="en-US" dirty="0" err="1"/>
-              <a:t>vv_StudentGradeDetails</a:t>
-            </a:r>
-            <a:r>
-              <a:rPr lang="en-US" dirty="0"/>
-              <a:t>) that will List all Students (FirstName and </a:t>
-            </a:r>
-            <a:r>
-              <a:rPr lang="en-US" dirty="0" err="1"/>
-              <a:t>LastName</a:t>
-            </a:r>
-            <a:r>
-              <a:rPr lang="en-US" dirty="0"/>
-              <a:t>) and Count the courses he passed through the exam(</a:t>
-            </a:r>
-            <a:r>
-              <a:rPr lang="en-US" dirty="0" err="1"/>
-              <a:t>Ispit</a:t>
-            </a:r>
-            <a:r>
-              <a:rPr lang="en-US" dirty="0"/>
-              <a:t>)</a:t>
-            </a:r>
-            <a:endParaRPr lang="mk-MK" dirty="0"/>
-          </a:p>
-        </p:txBody>
-      </p:sp>
-    </p:spTree>
-    <p:extLst>
-      <p:ext uri="{BB962C8B-B14F-4D97-AF65-F5344CB8AC3E}">
-        <p14:creationId xmlns:p14="http://schemas.microsoft.com/office/powerpoint/2010/main" val="4253166879"/>
-      </p:ext>
-    </p:extLst>
-  </p:cSld>
-  <p:clrMapOvr>
-    <a:masterClrMapping/>
-  </p:clrMapOvr>
 </p:sld>
 </file>
 

</xml_diff>